<commit_message>
added model curves and more text
</commit_message>
<xml_diff>
--- a/presentation/interview.pptx
+++ b/presentation/interview.pptx
@@ -5,16 +5,17 @@
     <p:sldMasterId id="2147483660" r:id="rId1"/>
   </p:sldMasterIdLst>
   <p:notesMasterIdLst>
-    <p:notesMasterId r:id="rId9"/>
+    <p:notesMasterId r:id="rId10"/>
   </p:notesMasterIdLst>
   <p:sldIdLst>
     <p:sldId id="256" r:id="rId2"/>
     <p:sldId id="258" r:id="rId3"/>
     <p:sldId id="257" r:id="rId4"/>
     <p:sldId id="260" r:id="rId5"/>
-    <p:sldId id="259" r:id="rId6"/>
-    <p:sldId id="262" r:id="rId7"/>
-    <p:sldId id="261" r:id="rId8"/>
+    <p:sldId id="263" r:id="rId6"/>
+    <p:sldId id="259" r:id="rId7"/>
+    <p:sldId id="262" r:id="rId8"/>
+    <p:sldId id="261" r:id="rId9"/>
   </p:sldIdLst>
   <p:sldSz cx="12192000" cy="6858000"/>
   <p:notesSz cx="6858000" cy="9144000"/>
@@ -4745,25 +4746,7 @@
           <a:p>
             <a:r>
               <a:rPr lang="en-US" dirty="0"/>
-              <a:t>Premise</a:t>
-            </a:r>
-          </a:p>
-          <a:p>
-            <a:r>
-              <a:rPr lang="en-US" dirty="0"/>
-              <a:t>Hazard models</a:t>
-            </a:r>
-          </a:p>
-          <a:p>
-            <a:r>
-              <a:rPr lang="en-US" dirty="0"/>
-              <a:t>Simulations</a:t>
-            </a:r>
-          </a:p>
-          <a:p>
-            <a:r>
-              <a:rPr lang="en-US" dirty="0"/>
-              <a:t>Comparison</a:t>
+              <a:t>Weibull vs Royston-Parmar spline</a:t>
             </a:r>
           </a:p>
           <a:p>
@@ -4859,6 +4842,42 @@
           </a:p>
         </p:txBody>
       </p:sp>
+      <p:pic>
+        <p:nvPicPr>
+          <p:cNvPr id="8" name="Graphic 7">
+            <a:extLst>
+              <a:ext uri="{FF2B5EF4-FFF2-40B4-BE49-F238E27FC236}">
+                <a16:creationId xmlns:a16="http://schemas.microsoft.com/office/drawing/2014/main" id="{D6E384F1-F1D5-8AB9-9B21-661EFBC68B5B}"/>
+              </a:ext>
+            </a:extLst>
+          </p:cNvPr>
+          <p:cNvPicPr>
+            <a:picLocks noChangeAspect="1"/>
+          </p:cNvPicPr>
+          <p:nvPr/>
+        </p:nvPicPr>
+        <p:blipFill>
+          <a:blip r:embed="rId2">
+            <a:extLst>
+              <a:ext uri="{96DAC541-7B7A-43D3-8B79-37D633B846F1}">
+                <asvg:svgBlip xmlns:asvg="http://schemas.microsoft.com/office/drawing/2016/SVG/main" r:embed="rId3"/>
+              </a:ext>
+            </a:extLst>
+          </a:blip>
+          <a:stretch>
+            <a:fillRect/>
+          </a:stretch>
+        </p:blipFill>
+        <p:spPr>
+          <a:xfrm>
+            <a:off x="3575999" y="2381685"/>
+            <a:ext cx="5040000" cy="4145088"/>
+          </a:xfrm>
+          <a:prstGeom prst="rect">
+            <a:avLst/>
+          </a:prstGeom>
+        </p:spPr>
+      </p:pic>
     </p:spTree>
     <p:extLst>
       <p:ext uri="{BB962C8B-B14F-4D97-AF65-F5344CB8AC3E}">
@@ -4894,7 +4913,7 @@
           <p:cNvPr id="2" name="Title 1">
             <a:extLst>
               <a:ext uri="{FF2B5EF4-FFF2-40B4-BE49-F238E27FC236}">
-                <a16:creationId xmlns:a16="http://schemas.microsoft.com/office/drawing/2014/main" id="{5CAF4DF5-C90E-2B0A-0CAA-8C0B3E55E19B}"/>
+                <a16:creationId xmlns:a16="http://schemas.microsoft.com/office/drawing/2014/main" id="{17FCE676-B97A-4026-9CC3-92147AE350AA}"/>
               </a:ext>
             </a:extLst>
           </p:cNvPr>
@@ -4912,38 +4931,90 @@
           <a:p>
             <a:r>
               <a:rPr lang="en-US" dirty="0"/>
-              <a:t>Simulations</a:t>
-            </a:r>
-          </a:p>
-        </p:txBody>
-      </p:sp>
-      <p:sp>
-        <p:nvSpPr>
-          <p:cNvPr id="4" name="Date Placeholder 3">
-            <a:extLst>
-              <a:ext uri="{FF2B5EF4-FFF2-40B4-BE49-F238E27FC236}">
-                <a16:creationId xmlns:a16="http://schemas.microsoft.com/office/drawing/2014/main" id="{BD18978C-FEA2-C1D5-0FA5-0A74ED639669}"/>
-              </a:ext>
-            </a:extLst>
-          </p:cNvPr>
-          <p:cNvSpPr>
-            <a:spLocks noGrp="1"/>
-          </p:cNvSpPr>
-          <p:nvPr>
-            <p:ph type="dt" sz="half" idx="2"/>
-          </p:nvPr>
-        </p:nvSpPr>
-        <p:spPr>
-          <a:xfrm rot="5400000">
-            <a:off x="-2250791" y="3107399"/>
-            <a:ext cx="5856571" cy="540000"/>
-          </a:xfrm>
-        </p:spPr>
+              <a:t>Implementation</a:t>
+            </a:r>
+          </a:p>
+        </p:txBody>
+      </p:sp>
+      <p:sp>
+        <p:nvSpPr>
+          <p:cNvPr id="3" name="Content Placeholder 2">
+            <a:extLst>
+              <a:ext uri="{FF2B5EF4-FFF2-40B4-BE49-F238E27FC236}">
+                <a16:creationId xmlns:a16="http://schemas.microsoft.com/office/drawing/2014/main" id="{3EB3F950-1632-18CF-C3B8-1AEB5BC53B0D}"/>
+              </a:ext>
+            </a:extLst>
+          </p:cNvPr>
+          <p:cNvSpPr>
+            <a:spLocks noGrp="1"/>
+          </p:cNvSpPr>
+          <p:nvPr>
+            <p:ph sz="half" idx="10"/>
+          </p:nvPr>
+        </p:nvSpPr>
+        <p:spPr/>
         <p:txBody>
           <a:bodyPr/>
           <a:lstStyle/>
           <a:p>
             <a:r>
+              <a:rPr lang="en-US" dirty="0"/>
+              <a:t>Used R</a:t>
+            </a:r>
+          </a:p>
+          <a:p>
+            <a:r>
+              <a:rPr lang="en-US" dirty="0"/>
+              <a:t>Estimated hazard from the data</a:t>
+            </a:r>
+          </a:p>
+          <a:p>
+            <a:r>
+              <a:rPr lang="en-US" dirty="0"/>
+              <a:t>Used two different models</a:t>
+            </a:r>
+          </a:p>
+          <a:p>
+            <a:endParaRPr lang="en-US" dirty="0"/>
+          </a:p>
+          <a:p>
+            <a:r>
+              <a:rPr lang="en-US" dirty="0"/>
+              <a:t>Code available on </a:t>
+            </a:r>
+            <a:r>
+              <a:rPr lang="en-US" dirty="0" err="1"/>
+              <a:t>github</a:t>
+            </a:r>
+            <a:endParaRPr lang="en-US" dirty="0"/>
+          </a:p>
+          <a:p>
+            <a:endParaRPr lang="en-US" dirty="0"/>
+          </a:p>
+        </p:txBody>
+      </p:sp>
+      <p:sp>
+        <p:nvSpPr>
+          <p:cNvPr id="4" name="Date Placeholder 3">
+            <a:extLst>
+              <a:ext uri="{FF2B5EF4-FFF2-40B4-BE49-F238E27FC236}">
+                <a16:creationId xmlns:a16="http://schemas.microsoft.com/office/drawing/2014/main" id="{BD21AC86-E277-F55E-0BD6-9FDAA64B18F5}"/>
+              </a:ext>
+            </a:extLst>
+          </p:cNvPr>
+          <p:cNvSpPr>
+            <a:spLocks noGrp="1"/>
+          </p:cNvSpPr>
+          <p:nvPr>
+            <p:ph type="dt" sz="half" idx="2"/>
+          </p:nvPr>
+        </p:nvSpPr>
+        <p:spPr/>
+        <p:txBody>
+          <a:bodyPr/>
+          <a:lstStyle/>
+          <a:p>
+            <a:r>
               <a:rPr lang="de-DE"/>
               <a:t>3 JUN 24</a:t>
             </a:r>
@@ -4956,7 +5027,7 @@
           <p:cNvPr id="5" name="Footer Placeholder 4">
             <a:extLst>
               <a:ext uri="{FF2B5EF4-FFF2-40B4-BE49-F238E27FC236}">
-                <a16:creationId xmlns:a16="http://schemas.microsoft.com/office/drawing/2014/main" id="{50FECC4C-D60F-8AA2-EDD6-1205EC73E5B5}"/>
+                <a16:creationId xmlns:a16="http://schemas.microsoft.com/office/drawing/2014/main" id="{AA0C739C-809C-F24B-7238-8062366C5308}"/>
               </a:ext>
             </a:extLst>
           </p:cNvPr>
@@ -4967,12 +5038,7 @@
             <p:ph type="ftr" sz="quarter" idx="3"/>
           </p:nvPr>
         </p:nvSpPr>
-        <p:spPr>
-          <a:xfrm rot="16200000">
-            <a:off x="9552505" y="4073685"/>
-            <a:ext cx="3924000" cy="540000"/>
-          </a:xfrm>
-        </p:spPr>
+        <p:spPr/>
         <p:txBody>
           <a:bodyPr/>
           <a:lstStyle/>
@@ -4990,7 +5056,7 @@
           <p:cNvPr id="6" name="Slide Number Placeholder 5">
             <a:extLst>
               <a:ext uri="{FF2B5EF4-FFF2-40B4-BE49-F238E27FC236}">
-                <a16:creationId xmlns:a16="http://schemas.microsoft.com/office/drawing/2014/main" id="{D707A01A-3BF7-F38E-9CE0-B758E9ED42FC}"/>
+                <a16:creationId xmlns:a16="http://schemas.microsoft.com/office/drawing/2014/main" id="{B3904964-B4F4-ED44-2388-52E3B1B70601}"/>
               </a:ext>
             </a:extLst>
           </p:cNvPr>
@@ -5001,62 +5067,24 @@
             <p:ph type="sldNum" sz="quarter" idx="4"/>
           </p:nvPr>
         </p:nvSpPr>
-        <p:spPr>
-          <a:xfrm>
-            <a:off x="11154506" y="572191"/>
-            <a:ext cx="629999" cy="540000"/>
-          </a:xfrm>
-        </p:spPr>
+        <p:spPr/>
         <p:txBody>
           <a:bodyPr/>
           <a:lstStyle/>
           <a:p>
             <a:fld id="{48F63A3B-78C7-47BE-AE5E-E10140E04643}" type="slidenum">
               <a:rPr lang="en-US" smtClean="0"/>
+              <a:pPr/>
               <a:t>5</a:t>
             </a:fld>
             <a:endParaRPr lang="en-US" dirty="0"/>
           </a:p>
         </p:txBody>
       </p:sp>
-      <p:pic>
-        <p:nvPicPr>
-          <p:cNvPr id="15" name="Content Placeholder 14">
-            <a:extLst>
-              <a:ext uri="{FF2B5EF4-FFF2-40B4-BE49-F238E27FC236}">
-                <a16:creationId xmlns:a16="http://schemas.microsoft.com/office/drawing/2014/main" id="{069259A0-F283-E562-9B9B-38746DA7E395}"/>
-              </a:ext>
-            </a:extLst>
-          </p:cNvPr>
-          <p:cNvPicPr>
-            <a:picLocks noGrp="1" noChangeAspect="1"/>
-          </p:cNvPicPr>
-          <p:nvPr>
-            <p:ph sz="half" idx="10"/>
-          </p:nvPr>
-        </p:nvPicPr>
-        <p:blipFill>
-          <a:blip r:embed="rId2">
-            <a:extLst>
-              <a:ext uri="{96DAC541-7B7A-43D3-8B79-37D633B846F1}">
-                <asvg:svgBlip xmlns:asvg="http://schemas.microsoft.com/office/drawing/2016/SVG/main" r:embed="rId3"/>
-              </a:ext>
-            </a:extLst>
-          </a:blip>
-          <a:srcRect/>
-          <a:stretch/>
-        </p:blipFill>
-        <p:spPr>
-          <a:xfrm>
-            <a:off x="3042366" y="1504973"/>
-            <a:ext cx="6107267" cy="5022850"/>
-          </a:xfrm>
-        </p:spPr>
-      </p:pic>
     </p:spTree>
     <p:extLst>
       <p:ext uri="{BB962C8B-B14F-4D97-AF65-F5344CB8AC3E}">
-        <p14:creationId xmlns:p14="http://schemas.microsoft.com/office/powerpoint/2010/main" val="646070328"/>
+        <p14:creationId xmlns:p14="http://schemas.microsoft.com/office/powerpoint/2010/main" val="2461502498"/>
       </p:ext>
     </p:extLst>
   </p:cSld>
@@ -5088,7 +5116,7 @@
           <p:cNvPr id="2" name="Title 1">
             <a:extLst>
               <a:ext uri="{FF2B5EF4-FFF2-40B4-BE49-F238E27FC236}">
-                <a16:creationId xmlns:a16="http://schemas.microsoft.com/office/drawing/2014/main" id="{17FCE676-B97A-4026-9CC3-92147AE350AA}"/>
+                <a16:creationId xmlns:a16="http://schemas.microsoft.com/office/drawing/2014/main" id="{5CAF4DF5-C90E-2B0A-0CAA-8C0B3E55E19B}"/>
               </a:ext>
             </a:extLst>
           </p:cNvPr>
@@ -5106,84 +5134,74 @@
           <a:p>
             <a:r>
               <a:rPr lang="en-US" dirty="0"/>
-              <a:t>Comparison</a:t>
-            </a:r>
-          </a:p>
-        </p:txBody>
-      </p:sp>
-      <p:sp>
-        <p:nvSpPr>
-          <p:cNvPr id="3" name="Content Placeholder 2">
-            <a:extLst>
-              <a:ext uri="{FF2B5EF4-FFF2-40B4-BE49-F238E27FC236}">
-                <a16:creationId xmlns:a16="http://schemas.microsoft.com/office/drawing/2014/main" id="{3EB3F950-1632-18CF-C3B8-1AEB5BC53B0D}"/>
-              </a:ext>
-            </a:extLst>
-          </p:cNvPr>
-          <p:cNvSpPr>
-            <a:spLocks noGrp="1"/>
-          </p:cNvSpPr>
-          <p:nvPr>
-            <p:ph sz="half" idx="10"/>
-          </p:nvPr>
-        </p:nvSpPr>
-        <p:spPr/>
+              <a:t>Simulations</a:t>
+            </a:r>
+          </a:p>
+        </p:txBody>
+      </p:sp>
+      <p:sp>
+        <p:nvSpPr>
+          <p:cNvPr id="4" name="Date Placeholder 3">
+            <a:extLst>
+              <a:ext uri="{FF2B5EF4-FFF2-40B4-BE49-F238E27FC236}">
+                <a16:creationId xmlns:a16="http://schemas.microsoft.com/office/drawing/2014/main" id="{BD18978C-FEA2-C1D5-0FA5-0A74ED639669}"/>
+              </a:ext>
+            </a:extLst>
+          </p:cNvPr>
+          <p:cNvSpPr>
+            <a:spLocks noGrp="1"/>
+          </p:cNvSpPr>
+          <p:nvPr>
+            <p:ph type="dt" sz="half" idx="2"/>
+          </p:nvPr>
+        </p:nvSpPr>
+        <p:spPr>
+          <a:xfrm rot="5400000">
+            <a:off x="-2250791" y="3107399"/>
+            <a:ext cx="5856571" cy="540000"/>
+          </a:xfrm>
+        </p:spPr>
         <p:txBody>
           <a:bodyPr/>
           <a:lstStyle/>
           <a:p>
             <a:r>
-              <a:rPr lang="en-US" dirty="0"/>
-              <a:t>Premise</a:t>
-            </a:r>
-          </a:p>
-          <a:p>
-            <a:r>
-              <a:rPr lang="en-US" dirty="0"/>
-              <a:t>Hazard models</a:t>
-            </a:r>
-          </a:p>
-          <a:p>
-            <a:r>
-              <a:rPr lang="en-US" dirty="0"/>
-              <a:t>Simulations</a:t>
-            </a:r>
-          </a:p>
-          <a:p>
-            <a:r>
-              <a:rPr lang="en-US" dirty="0"/>
-              <a:t>Comparison</a:t>
-            </a:r>
-          </a:p>
-          <a:p>
+              <a:rPr lang="de-DE"/>
+              <a:t>3 JUN 24</a:t>
+            </a:r>
             <a:endParaRPr lang="en-US" dirty="0"/>
           </a:p>
         </p:txBody>
       </p:sp>
       <p:sp>
         <p:nvSpPr>
-          <p:cNvPr id="4" name="Date Placeholder 3">
-            <a:extLst>
-              <a:ext uri="{FF2B5EF4-FFF2-40B4-BE49-F238E27FC236}">
-                <a16:creationId xmlns:a16="http://schemas.microsoft.com/office/drawing/2014/main" id="{BD21AC86-E277-F55E-0BD6-9FDAA64B18F5}"/>
-              </a:ext>
-            </a:extLst>
-          </p:cNvPr>
-          <p:cNvSpPr>
-            <a:spLocks noGrp="1"/>
-          </p:cNvSpPr>
-          <p:nvPr>
-            <p:ph type="dt" sz="half" idx="2"/>
-          </p:nvPr>
-        </p:nvSpPr>
-        <p:spPr/>
+          <p:cNvPr id="5" name="Footer Placeholder 4">
+            <a:extLst>
+              <a:ext uri="{FF2B5EF4-FFF2-40B4-BE49-F238E27FC236}">
+                <a16:creationId xmlns:a16="http://schemas.microsoft.com/office/drawing/2014/main" id="{50FECC4C-D60F-8AA2-EDD6-1205EC73E5B5}"/>
+              </a:ext>
+            </a:extLst>
+          </p:cNvPr>
+          <p:cNvSpPr>
+            <a:spLocks noGrp="1"/>
+          </p:cNvSpPr>
+          <p:nvPr>
+            <p:ph type="ftr" sz="quarter" idx="3"/>
+          </p:nvPr>
+        </p:nvSpPr>
+        <p:spPr>
+          <a:xfrm rot="16200000">
+            <a:off x="9552505" y="4073685"/>
+            <a:ext cx="3924000" cy="540000"/>
+          </a:xfrm>
+        </p:spPr>
         <p:txBody>
           <a:bodyPr/>
           <a:lstStyle/>
           <a:p>
             <a:r>
-              <a:rPr lang="de-DE"/>
-              <a:t>3 JUN 24</a:t>
+              <a:rPr lang="en-US"/>
+              <a:t>SIMULATION 10499</a:t>
             </a:r>
             <a:endParaRPr lang="en-US" dirty="0"/>
           </a:p>
@@ -5191,67 +5209,76 @@
       </p:sp>
       <p:sp>
         <p:nvSpPr>
-          <p:cNvPr id="5" name="Footer Placeholder 4">
-            <a:extLst>
-              <a:ext uri="{FF2B5EF4-FFF2-40B4-BE49-F238E27FC236}">
-                <a16:creationId xmlns:a16="http://schemas.microsoft.com/office/drawing/2014/main" id="{AA0C739C-809C-F24B-7238-8062366C5308}"/>
-              </a:ext>
-            </a:extLst>
-          </p:cNvPr>
-          <p:cNvSpPr>
-            <a:spLocks noGrp="1"/>
-          </p:cNvSpPr>
-          <p:nvPr>
-            <p:ph type="ftr" sz="quarter" idx="3"/>
-          </p:nvPr>
-        </p:nvSpPr>
-        <p:spPr/>
+          <p:cNvPr id="6" name="Slide Number Placeholder 5">
+            <a:extLst>
+              <a:ext uri="{FF2B5EF4-FFF2-40B4-BE49-F238E27FC236}">
+                <a16:creationId xmlns:a16="http://schemas.microsoft.com/office/drawing/2014/main" id="{D707A01A-3BF7-F38E-9CE0-B758E9ED42FC}"/>
+              </a:ext>
+            </a:extLst>
+          </p:cNvPr>
+          <p:cNvSpPr>
+            <a:spLocks noGrp="1"/>
+          </p:cNvSpPr>
+          <p:nvPr>
+            <p:ph type="sldNum" sz="quarter" idx="4"/>
+          </p:nvPr>
+        </p:nvSpPr>
+        <p:spPr>
+          <a:xfrm>
+            <a:off x="11154506" y="572191"/>
+            <a:ext cx="629999" cy="540000"/>
+          </a:xfrm>
+        </p:spPr>
         <p:txBody>
           <a:bodyPr/>
           <a:lstStyle/>
           <a:p>
-            <a:r>
-              <a:rPr lang="en-US"/>
-              <a:t>SIMULATION 10499</a:t>
-            </a:r>
-            <a:endParaRPr lang="en-US" dirty="0"/>
-          </a:p>
-        </p:txBody>
-      </p:sp>
-      <p:sp>
-        <p:nvSpPr>
-          <p:cNvPr id="6" name="Slide Number Placeholder 5">
-            <a:extLst>
-              <a:ext uri="{FF2B5EF4-FFF2-40B4-BE49-F238E27FC236}">
-                <a16:creationId xmlns:a16="http://schemas.microsoft.com/office/drawing/2014/main" id="{B3904964-B4F4-ED44-2388-52E3B1B70601}"/>
-              </a:ext>
-            </a:extLst>
-          </p:cNvPr>
-          <p:cNvSpPr>
-            <a:spLocks noGrp="1"/>
-          </p:cNvSpPr>
-          <p:nvPr>
-            <p:ph type="sldNum" sz="quarter" idx="4"/>
-          </p:nvPr>
-        </p:nvSpPr>
-        <p:spPr/>
-        <p:txBody>
-          <a:bodyPr/>
-          <a:lstStyle/>
-          <a:p>
             <a:fld id="{48F63A3B-78C7-47BE-AE5E-E10140E04643}" type="slidenum">
               <a:rPr lang="en-US" smtClean="0"/>
-              <a:pPr/>
               <a:t>6</a:t>
             </a:fld>
             <a:endParaRPr lang="en-US" dirty="0"/>
           </a:p>
         </p:txBody>
       </p:sp>
+      <p:pic>
+        <p:nvPicPr>
+          <p:cNvPr id="15" name="Content Placeholder 14">
+            <a:extLst>
+              <a:ext uri="{FF2B5EF4-FFF2-40B4-BE49-F238E27FC236}">
+                <a16:creationId xmlns:a16="http://schemas.microsoft.com/office/drawing/2014/main" id="{069259A0-F283-E562-9B9B-38746DA7E395}"/>
+              </a:ext>
+            </a:extLst>
+          </p:cNvPr>
+          <p:cNvPicPr>
+            <a:picLocks noGrp="1" noChangeAspect="1"/>
+          </p:cNvPicPr>
+          <p:nvPr>
+            <p:ph sz="half" idx="10"/>
+          </p:nvPr>
+        </p:nvPicPr>
+        <p:blipFill>
+          <a:blip r:embed="rId2">
+            <a:extLst>
+              <a:ext uri="{96DAC541-7B7A-43D3-8B79-37D633B846F1}">
+                <asvg:svgBlip xmlns:asvg="http://schemas.microsoft.com/office/drawing/2016/SVG/main" r:embed="rId3"/>
+              </a:ext>
+            </a:extLst>
+          </a:blip>
+          <a:srcRect/>
+          <a:stretch/>
+        </p:blipFill>
+        <p:spPr>
+          <a:xfrm>
+            <a:off x="3042366" y="1504973"/>
+            <a:ext cx="6107267" cy="5022850"/>
+          </a:xfrm>
+        </p:spPr>
+      </p:pic>
     </p:spTree>
     <p:extLst>
       <p:ext uri="{BB962C8B-B14F-4D97-AF65-F5344CB8AC3E}">
-        <p14:creationId xmlns:p14="http://schemas.microsoft.com/office/powerpoint/2010/main" val="2377741877"/>
+        <p14:creationId xmlns:p14="http://schemas.microsoft.com/office/powerpoint/2010/main" val="646070328"/>
       </p:ext>
     </p:extLst>
   </p:cSld>
@@ -5301,60 +5328,118 @@
           <a:p>
             <a:r>
               <a:rPr lang="en-US" dirty="0"/>
-              <a:t>Take away</a:t>
-            </a:r>
-          </a:p>
-        </p:txBody>
-      </p:sp>
-      <p:sp>
-        <p:nvSpPr>
-          <p:cNvPr id="3" name="Content Placeholder 2">
-            <a:extLst>
-              <a:ext uri="{FF2B5EF4-FFF2-40B4-BE49-F238E27FC236}">
-                <a16:creationId xmlns:a16="http://schemas.microsoft.com/office/drawing/2014/main" id="{3EB3F950-1632-18CF-C3B8-1AEB5BC53B0D}"/>
-              </a:ext>
-            </a:extLst>
-          </p:cNvPr>
-          <p:cNvSpPr>
-            <a:spLocks noGrp="1"/>
-          </p:cNvSpPr>
-          <p:nvPr>
-            <p:ph sz="half" idx="10"/>
-          </p:nvPr>
-        </p:nvSpPr>
-        <p:spPr/>
-        <p:txBody>
-          <a:bodyPr/>
-          <a:lstStyle/>
-          <a:p>
-            <a:r>
-              <a:rPr lang="en-US" dirty="0"/>
-              <a:t>Premise</a:t>
-            </a:r>
-          </a:p>
-          <a:p>
-            <a:r>
-              <a:rPr lang="en-US" dirty="0"/>
-              <a:t>Hazard models</a:t>
-            </a:r>
-          </a:p>
-          <a:p>
-            <a:r>
-              <a:rPr lang="en-US" dirty="0"/>
-              <a:t>Simulations</a:t>
-            </a:r>
-          </a:p>
-          <a:p>
-            <a:r>
-              <a:rPr lang="en-US" dirty="0"/>
               <a:t>Comparison</a:t>
             </a:r>
           </a:p>
-          <a:p>
-            <a:endParaRPr lang="en-US" dirty="0"/>
-          </a:p>
-        </p:txBody>
-      </p:sp>
+        </p:txBody>
+      </p:sp>
+      <mc:AlternateContent xmlns:mc="http://schemas.openxmlformats.org/markup-compatibility/2006">
+        <mc:Choice xmlns:a14="http://schemas.microsoft.com/office/drawing/2010/main" Requires="a14">
+          <p:sp>
+            <p:nvSpPr>
+              <p:cNvPr id="3" name="Content Placeholder 2">
+                <a:extLst>
+                  <a:ext uri="{FF2B5EF4-FFF2-40B4-BE49-F238E27FC236}">
+                    <a16:creationId xmlns:a16="http://schemas.microsoft.com/office/drawing/2014/main" id="{3EB3F950-1632-18CF-C3B8-1AEB5BC53B0D}"/>
+                  </a:ext>
+                </a:extLst>
+              </p:cNvPr>
+              <p:cNvSpPr>
+                <a:spLocks noGrp="1"/>
+              </p:cNvSpPr>
+              <p:nvPr>
+                <p:ph sz="half" idx="10"/>
+              </p:nvPr>
+            </p:nvSpPr>
+            <p:spPr/>
+            <p:txBody>
+              <a:bodyPr/>
+              <a:lstStyle/>
+              <a:p>
+                <a14:m>
+                  <m:oMath xmlns:m="http://schemas.openxmlformats.org/officeDocument/2006/math">
+                    <m:r>
+                      <a:rPr lang="en-US" i="1" dirty="0" smtClean="0">
+                        <a:latin typeface="Cambria Math" panose="02040503050406030204" pitchFamily="18" charset="0"/>
+                      </a:rPr>
+                      <m:t>1</m:t>
+                    </m:r>
+                    <m:r>
+                      <a:rPr lang="en-US" i="1" dirty="0">
+                        <a:latin typeface="Cambria Math" panose="02040503050406030204" pitchFamily="18" charset="0"/>
+                      </a:rPr>
+                      <m:t>1</m:t>
+                    </m:r>
+                    <m:r>
+                      <a:rPr lang="en-US" i="1" dirty="0" smtClean="0">
+                        <a:latin typeface="Cambria Math" panose="02040503050406030204" pitchFamily="18" charset="0"/>
+                      </a:rPr>
+                      <m:t>% </m:t>
+                    </m:r>
+                  </m:oMath>
+                </a14:m>
+                <a:r>
+                  <a:rPr lang="en-US" dirty="0"/>
+                  <a:t>vs </a:t>
+                </a:r>
+                <a14:m>
+                  <m:oMath xmlns:m="http://schemas.openxmlformats.org/officeDocument/2006/math">
+                    <m:r>
+                      <a:rPr lang="en-US" i="1" dirty="0" smtClean="0">
+                        <a:latin typeface="Cambria Math" panose="02040503050406030204" pitchFamily="18" charset="0"/>
+                      </a:rPr>
+                      <m:t>5% </m:t>
+                    </m:r>
+                  </m:oMath>
+                </a14:m>
+                <a:r>
+                  <a:rPr lang="en-US" dirty="0"/>
+                  <a:t>bias</a:t>
+                </a:r>
+              </a:p>
+            </p:txBody>
+          </p:sp>
+        </mc:Choice>
+        <mc:Fallback>
+          <p:sp>
+            <p:nvSpPr>
+              <p:cNvPr id="3" name="Content Placeholder 2">
+                <a:extLst>
+                  <a:ext uri="{FF2B5EF4-FFF2-40B4-BE49-F238E27FC236}">
+                    <a16:creationId xmlns:a16="http://schemas.microsoft.com/office/drawing/2014/main" id="{3EB3F950-1632-18CF-C3B8-1AEB5BC53B0D}"/>
+                  </a:ext>
+                </a:extLst>
+              </p:cNvPr>
+              <p:cNvSpPr>
+                <a:spLocks noGrp="1" noRot="1" noChangeAspect="1" noMove="1" noResize="1" noEditPoints="1" noAdjustHandles="1" noChangeArrowheads="1" noChangeShapeType="1" noTextEdit="1"/>
+              </p:cNvSpPr>
+              <p:nvPr>
+                <p:ph sz="half" idx="10"/>
+              </p:nvPr>
+            </p:nvSpPr>
+            <p:spPr>
+              <a:blipFill>
+                <a:blip r:embed="rId2"/>
+                <a:stretch>
+                  <a:fillRect l="-1220" t="-2015"/>
+                </a:stretch>
+              </a:blipFill>
+            </p:spPr>
+            <p:txBody>
+              <a:bodyPr/>
+              <a:lstStyle/>
+              <a:p>
+                <a:r>
+                  <a:rPr lang="en-US">
+                    <a:noFill/>
+                  </a:rPr>
+                  <a:t> </a:t>
+                </a:r>
+              </a:p>
+            </p:txBody>
+          </p:sp>
+        </mc:Fallback>
+      </mc:AlternateContent>
       <p:sp>
         <p:nvSpPr>
           <p:cNvPr id="4" name="Date Placeholder 3">
@@ -5438,6 +5523,201 @@
               <a:rPr lang="en-US" smtClean="0"/>
               <a:pPr/>
               <a:t>7</a:t>
+            </a:fld>
+            <a:endParaRPr lang="en-US" dirty="0"/>
+          </a:p>
+        </p:txBody>
+      </p:sp>
+    </p:spTree>
+    <p:extLst>
+      <p:ext uri="{BB962C8B-B14F-4D97-AF65-F5344CB8AC3E}">
+        <p14:creationId xmlns:p14="http://schemas.microsoft.com/office/powerpoint/2010/main" val="2377741877"/>
+      </p:ext>
+    </p:extLst>
+  </p:cSld>
+  <p:clrMapOvr>
+    <a:masterClrMapping/>
+  </p:clrMapOvr>
+</p:sld>
+</file>
+
+<file path=ppt/slides/slide8.xml><?xml version="1.0" encoding="utf-8"?>
+<p:sld xmlns:a="http://schemas.openxmlformats.org/drawingml/2006/main" xmlns:r="http://schemas.openxmlformats.org/officeDocument/2006/relationships" xmlns:p="http://schemas.openxmlformats.org/presentationml/2006/main">
+  <p:cSld>
+    <p:spTree>
+      <p:nvGrpSpPr>
+        <p:cNvPr id="1" name=""/>
+        <p:cNvGrpSpPr/>
+        <p:nvPr/>
+      </p:nvGrpSpPr>
+      <p:grpSpPr>
+        <a:xfrm>
+          <a:off x="0" y="0"/>
+          <a:ext cx="0" cy="0"/>
+          <a:chOff x="0" y="0"/>
+          <a:chExt cx="0" cy="0"/>
+        </a:xfrm>
+      </p:grpSpPr>
+      <p:sp>
+        <p:nvSpPr>
+          <p:cNvPr id="2" name="Title 1">
+            <a:extLst>
+              <a:ext uri="{FF2B5EF4-FFF2-40B4-BE49-F238E27FC236}">
+                <a16:creationId xmlns:a16="http://schemas.microsoft.com/office/drawing/2014/main" id="{17FCE676-B97A-4026-9CC3-92147AE350AA}"/>
+              </a:ext>
+            </a:extLst>
+          </p:cNvPr>
+          <p:cNvSpPr>
+            <a:spLocks noGrp="1"/>
+          </p:cNvSpPr>
+          <p:nvPr>
+            <p:ph type="title"/>
+          </p:nvPr>
+        </p:nvSpPr>
+        <p:spPr/>
+        <p:txBody>
+          <a:bodyPr/>
+          <a:lstStyle/>
+          <a:p>
+            <a:r>
+              <a:rPr lang="en-US" dirty="0"/>
+              <a:t>Take away</a:t>
+            </a:r>
+          </a:p>
+        </p:txBody>
+      </p:sp>
+      <p:sp>
+        <p:nvSpPr>
+          <p:cNvPr id="3" name="Content Placeholder 2">
+            <a:extLst>
+              <a:ext uri="{FF2B5EF4-FFF2-40B4-BE49-F238E27FC236}">
+                <a16:creationId xmlns:a16="http://schemas.microsoft.com/office/drawing/2014/main" id="{3EB3F950-1632-18CF-C3B8-1AEB5BC53B0D}"/>
+              </a:ext>
+            </a:extLst>
+          </p:cNvPr>
+          <p:cNvSpPr>
+            <a:spLocks noGrp="1"/>
+          </p:cNvSpPr>
+          <p:nvPr>
+            <p:ph sz="half" idx="10"/>
+          </p:nvPr>
+        </p:nvSpPr>
+        <p:spPr/>
+        <p:txBody>
+          <a:bodyPr/>
+          <a:lstStyle/>
+          <a:p>
+            <a:r>
+              <a:rPr lang="en-US" dirty="0"/>
+              <a:t>Premise</a:t>
+            </a:r>
+          </a:p>
+          <a:p>
+            <a:r>
+              <a:rPr lang="en-US" dirty="0"/>
+              <a:t>Hazard models</a:t>
+            </a:r>
+          </a:p>
+          <a:p>
+            <a:r>
+              <a:rPr lang="en-US" dirty="0"/>
+              <a:t>Simulations</a:t>
+            </a:r>
+          </a:p>
+          <a:p>
+            <a:r>
+              <a:rPr lang="en-US" dirty="0"/>
+              <a:t>Comparison</a:t>
+            </a:r>
+          </a:p>
+          <a:p>
+            <a:endParaRPr lang="en-US" dirty="0"/>
+          </a:p>
+        </p:txBody>
+      </p:sp>
+      <p:sp>
+        <p:nvSpPr>
+          <p:cNvPr id="4" name="Date Placeholder 3">
+            <a:extLst>
+              <a:ext uri="{FF2B5EF4-FFF2-40B4-BE49-F238E27FC236}">
+                <a16:creationId xmlns:a16="http://schemas.microsoft.com/office/drawing/2014/main" id="{BD21AC86-E277-F55E-0BD6-9FDAA64B18F5}"/>
+              </a:ext>
+            </a:extLst>
+          </p:cNvPr>
+          <p:cNvSpPr>
+            <a:spLocks noGrp="1"/>
+          </p:cNvSpPr>
+          <p:nvPr>
+            <p:ph type="dt" sz="half" idx="2"/>
+          </p:nvPr>
+        </p:nvSpPr>
+        <p:spPr/>
+        <p:txBody>
+          <a:bodyPr/>
+          <a:lstStyle/>
+          <a:p>
+            <a:r>
+              <a:rPr lang="de-DE"/>
+              <a:t>3 JUN 24</a:t>
+            </a:r>
+            <a:endParaRPr lang="en-US" dirty="0"/>
+          </a:p>
+        </p:txBody>
+      </p:sp>
+      <p:sp>
+        <p:nvSpPr>
+          <p:cNvPr id="5" name="Footer Placeholder 4">
+            <a:extLst>
+              <a:ext uri="{FF2B5EF4-FFF2-40B4-BE49-F238E27FC236}">
+                <a16:creationId xmlns:a16="http://schemas.microsoft.com/office/drawing/2014/main" id="{AA0C739C-809C-F24B-7238-8062366C5308}"/>
+              </a:ext>
+            </a:extLst>
+          </p:cNvPr>
+          <p:cNvSpPr>
+            <a:spLocks noGrp="1"/>
+          </p:cNvSpPr>
+          <p:nvPr>
+            <p:ph type="ftr" sz="quarter" idx="3"/>
+          </p:nvPr>
+        </p:nvSpPr>
+        <p:spPr/>
+        <p:txBody>
+          <a:bodyPr/>
+          <a:lstStyle/>
+          <a:p>
+            <a:r>
+              <a:rPr lang="en-US"/>
+              <a:t>SIMULATION 10499</a:t>
+            </a:r>
+            <a:endParaRPr lang="en-US" dirty="0"/>
+          </a:p>
+        </p:txBody>
+      </p:sp>
+      <p:sp>
+        <p:nvSpPr>
+          <p:cNvPr id="6" name="Slide Number Placeholder 5">
+            <a:extLst>
+              <a:ext uri="{FF2B5EF4-FFF2-40B4-BE49-F238E27FC236}">
+                <a16:creationId xmlns:a16="http://schemas.microsoft.com/office/drawing/2014/main" id="{B3904964-B4F4-ED44-2388-52E3B1B70601}"/>
+              </a:ext>
+            </a:extLst>
+          </p:cNvPr>
+          <p:cNvSpPr>
+            <a:spLocks noGrp="1"/>
+          </p:cNvSpPr>
+          <p:nvPr>
+            <p:ph type="sldNum" sz="quarter" idx="4"/>
+          </p:nvPr>
+        </p:nvSpPr>
+        <p:spPr/>
+        <p:txBody>
+          <a:bodyPr/>
+          <a:lstStyle/>
+          <a:p>
+            <a:fld id="{48F63A3B-78C7-47BE-AE5E-E10140E04643}" type="slidenum">
+              <a:rPr lang="en-US" smtClean="0"/>
+              <a:pPr/>
+              <a:t>8</a:t>
             </a:fld>
             <a:endParaRPr lang="en-US" dirty="0"/>
           </a:p>

</xml_diff>

<commit_message>
added sample size estimation
</commit_message>
<xml_diff>
--- a/presentation/interview.pptx
+++ b/presentation/interview.pptx
@@ -5,17 +5,22 @@
     <p:sldMasterId id="2147483660" r:id="rId1"/>
   </p:sldMasterIdLst>
   <p:notesMasterIdLst>
-    <p:notesMasterId r:id="rId10"/>
+    <p:notesMasterId r:id="rId15"/>
   </p:notesMasterIdLst>
   <p:sldIdLst>
     <p:sldId id="256" r:id="rId2"/>
     <p:sldId id="258" r:id="rId3"/>
-    <p:sldId id="257" r:id="rId4"/>
-    <p:sldId id="260" r:id="rId5"/>
-    <p:sldId id="263" r:id="rId6"/>
-    <p:sldId id="259" r:id="rId7"/>
-    <p:sldId id="262" r:id="rId8"/>
-    <p:sldId id="261" r:id="rId9"/>
+    <p:sldId id="266" r:id="rId4"/>
+    <p:sldId id="257" r:id="rId5"/>
+    <p:sldId id="265" r:id="rId6"/>
+    <p:sldId id="260" r:id="rId7"/>
+    <p:sldId id="259" r:id="rId8"/>
+    <p:sldId id="262" r:id="rId9"/>
+    <p:sldId id="267" r:id="rId10"/>
+    <p:sldId id="261" r:id="rId11"/>
+    <p:sldId id="263" r:id="rId12"/>
+    <p:sldId id="268" r:id="rId13"/>
+    <p:sldId id="264" r:id="rId14"/>
   </p:sldIdLst>
   <p:sldSz cx="12192000" cy="6858000"/>
   <p:notesSz cx="6858000" cy="9144000"/>
@@ -215,7 +220,7 @@
           <a:p>
             <a:fld id="{F9FEEFA0-FA33-E442-BDA1-D42C96098986}" type="datetimeFigureOut">
               <a:rPr lang="en-US" smtClean="0"/>
-              <a:t>5/26/24</a:t>
+              <a:t>6/2/24</a:t>
             </a:fld>
             <a:endParaRPr lang="en-US"/>
           </a:p>
@@ -4288,6 +4293,917 @@
 </p:sld>
 </file>
 
+<file path=ppt/slides/slide10.xml><?xml version="1.0" encoding="utf-8"?>
+<p:sld xmlns:a="http://schemas.openxmlformats.org/drawingml/2006/main" xmlns:r="http://schemas.openxmlformats.org/officeDocument/2006/relationships" xmlns:p="http://schemas.openxmlformats.org/presentationml/2006/main">
+  <p:cSld>
+    <p:spTree>
+      <p:nvGrpSpPr>
+        <p:cNvPr id="1" name=""/>
+        <p:cNvGrpSpPr/>
+        <p:nvPr/>
+      </p:nvGrpSpPr>
+      <p:grpSpPr>
+        <a:xfrm>
+          <a:off x="0" y="0"/>
+          <a:ext cx="0" cy="0"/>
+          <a:chOff x="0" y="0"/>
+          <a:chExt cx="0" cy="0"/>
+        </a:xfrm>
+      </p:grpSpPr>
+      <p:sp>
+        <p:nvSpPr>
+          <p:cNvPr id="2" name="Title 1">
+            <a:extLst>
+              <a:ext uri="{FF2B5EF4-FFF2-40B4-BE49-F238E27FC236}">
+                <a16:creationId xmlns:a16="http://schemas.microsoft.com/office/drawing/2014/main" id="{17FCE676-B97A-4026-9CC3-92147AE350AA}"/>
+              </a:ext>
+            </a:extLst>
+          </p:cNvPr>
+          <p:cNvSpPr>
+            <a:spLocks noGrp="1"/>
+          </p:cNvSpPr>
+          <p:nvPr>
+            <p:ph type="title"/>
+          </p:nvPr>
+        </p:nvSpPr>
+        <p:spPr/>
+        <p:txBody>
+          <a:bodyPr/>
+          <a:lstStyle/>
+          <a:p>
+            <a:r>
+              <a:rPr lang="en-US" dirty="0"/>
+              <a:t>Take away</a:t>
+            </a:r>
+          </a:p>
+        </p:txBody>
+      </p:sp>
+      <p:sp>
+        <p:nvSpPr>
+          <p:cNvPr id="4" name="Date Placeholder 3">
+            <a:extLst>
+              <a:ext uri="{FF2B5EF4-FFF2-40B4-BE49-F238E27FC236}">
+                <a16:creationId xmlns:a16="http://schemas.microsoft.com/office/drawing/2014/main" id="{BD21AC86-E277-F55E-0BD6-9FDAA64B18F5}"/>
+              </a:ext>
+            </a:extLst>
+          </p:cNvPr>
+          <p:cNvSpPr>
+            <a:spLocks noGrp="1"/>
+          </p:cNvSpPr>
+          <p:nvPr>
+            <p:ph type="dt" sz="half" idx="2"/>
+          </p:nvPr>
+        </p:nvSpPr>
+        <p:spPr/>
+        <p:txBody>
+          <a:bodyPr/>
+          <a:lstStyle/>
+          <a:p>
+            <a:r>
+              <a:rPr lang="de-DE"/>
+              <a:t>3 JUN 24</a:t>
+            </a:r>
+            <a:endParaRPr lang="en-US" dirty="0"/>
+          </a:p>
+        </p:txBody>
+      </p:sp>
+      <p:sp>
+        <p:nvSpPr>
+          <p:cNvPr id="5" name="Footer Placeholder 4">
+            <a:extLst>
+              <a:ext uri="{FF2B5EF4-FFF2-40B4-BE49-F238E27FC236}">
+                <a16:creationId xmlns:a16="http://schemas.microsoft.com/office/drawing/2014/main" id="{AA0C739C-809C-F24B-7238-8062366C5308}"/>
+              </a:ext>
+            </a:extLst>
+          </p:cNvPr>
+          <p:cNvSpPr>
+            <a:spLocks noGrp="1"/>
+          </p:cNvSpPr>
+          <p:nvPr>
+            <p:ph type="ftr" sz="quarter" idx="3"/>
+          </p:nvPr>
+        </p:nvSpPr>
+        <p:spPr/>
+        <p:txBody>
+          <a:bodyPr/>
+          <a:lstStyle/>
+          <a:p>
+            <a:r>
+              <a:rPr lang="en-US"/>
+              <a:t>SIMULATION 10499</a:t>
+            </a:r>
+            <a:endParaRPr lang="en-US" dirty="0"/>
+          </a:p>
+        </p:txBody>
+      </p:sp>
+      <p:sp>
+        <p:nvSpPr>
+          <p:cNvPr id="6" name="Slide Number Placeholder 5">
+            <a:extLst>
+              <a:ext uri="{FF2B5EF4-FFF2-40B4-BE49-F238E27FC236}">
+                <a16:creationId xmlns:a16="http://schemas.microsoft.com/office/drawing/2014/main" id="{B3904964-B4F4-ED44-2388-52E3B1B70601}"/>
+              </a:ext>
+            </a:extLst>
+          </p:cNvPr>
+          <p:cNvSpPr>
+            <a:spLocks noGrp="1"/>
+          </p:cNvSpPr>
+          <p:nvPr>
+            <p:ph type="sldNum" sz="quarter" idx="4"/>
+          </p:nvPr>
+        </p:nvSpPr>
+        <p:spPr/>
+        <p:txBody>
+          <a:bodyPr/>
+          <a:lstStyle/>
+          <a:p>
+            <a:fld id="{48F63A3B-78C7-47BE-AE5E-E10140E04643}" type="slidenum">
+              <a:rPr lang="en-US" smtClean="0"/>
+              <a:pPr/>
+              <a:t>10</a:t>
+            </a:fld>
+            <a:endParaRPr lang="en-US" dirty="0"/>
+          </a:p>
+        </p:txBody>
+      </p:sp>
+      <p:sp>
+        <p:nvSpPr>
+          <p:cNvPr id="7" name="Content Placeholder 2">
+            <a:extLst>
+              <a:ext uri="{FF2B5EF4-FFF2-40B4-BE49-F238E27FC236}">
+                <a16:creationId xmlns:a16="http://schemas.microsoft.com/office/drawing/2014/main" id="{224AAECF-91B3-86C2-3353-EEA9376CA92D}"/>
+              </a:ext>
+            </a:extLst>
+          </p:cNvPr>
+          <p:cNvSpPr>
+            <a:spLocks noGrp="1"/>
+          </p:cNvSpPr>
+          <p:nvPr>
+            <p:ph sz="half" idx="10"/>
+          </p:nvPr>
+        </p:nvSpPr>
+        <p:spPr>
+          <a:xfrm>
+            <a:off x="2496000" y="1655409"/>
+            <a:ext cx="7200000" cy="5023181"/>
+          </a:xfrm>
+        </p:spPr>
+        <p:txBody>
+          <a:bodyPr anchor="ctr"/>
+          <a:lstStyle/>
+          <a:p>
+            <a:pPr marL="542925" indent="-447675">
+              <a:buClr>
+                <a:srgbClr val="00E47C"/>
+              </a:buClr>
+              <a:buFont typeface="Courier New" panose="02070309020205020404" pitchFamily="49" charset="0"/>
+              <a:buChar char="o"/>
+            </a:pPr>
+            <a:r>
+              <a:rPr lang="en-US" dirty="0"/>
+              <a:t>Based on real-world leukemia dataset</a:t>
+            </a:r>
+          </a:p>
+          <a:p>
+            <a:pPr marL="542925" indent="-447675">
+              <a:buClr>
+                <a:srgbClr val="00E47C"/>
+              </a:buClr>
+              <a:buFont typeface="Courier New" panose="02070309020205020404" pitchFamily="49" charset="0"/>
+              <a:buChar char="o"/>
+            </a:pPr>
+            <a:endParaRPr lang="en-US" dirty="0"/>
+          </a:p>
+          <a:p>
+            <a:pPr marL="542925" indent="-447675">
+              <a:buClr>
+                <a:srgbClr val="00E47C"/>
+              </a:buClr>
+              <a:buFont typeface="Courier New" panose="02070309020205020404" pitchFamily="49" charset="0"/>
+              <a:buChar char="o"/>
+            </a:pPr>
+            <a:r>
+              <a:rPr lang="en-US" dirty="0"/>
+              <a:t>Estimated sample size for clinical trials</a:t>
+            </a:r>
+            <a:br>
+              <a:rPr lang="en-US" dirty="0"/>
+            </a:br>
+            <a:r>
+              <a:rPr lang="en-US" dirty="0"/>
+              <a:t>given level of significance and power</a:t>
+            </a:r>
+          </a:p>
+          <a:p>
+            <a:pPr marL="542925" indent="-447675">
+              <a:buClr>
+                <a:srgbClr val="00E47C"/>
+              </a:buClr>
+              <a:buFont typeface="Courier New" panose="02070309020205020404" pitchFamily="49" charset="0"/>
+              <a:buChar char="o"/>
+            </a:pPr>
+            <a:endParaRPr lang="en-US" dirty="0"/>
+          </a:p>
+          <a:p>
+            <a:pPr marL="542925" indent="-447675">
+              <a:buClr>
+                <a:srgbClr val="00E47C"/>
+              </a:buClr>
+              <a:buFont typeface="Courier New" panose="02070309020205020404" pitchFamily="49" charset="0"/>
+              <a:buChar char="o"/>
+            </a:pPr>
+            <a:endParaRPr lang="en-US" dirty="0"/>
+          </a:p>
+          <a:p>
+            <a:pPr marL="542925" indent="-447675">
+              <a:buClr>
+                <a:srgbClr val="00E47C"/>
+              </a:buClr>
+              <a:buFont typeface="Courier New" panose="02070309020205020404" pitchFamily="49" charset="0"/>
+              <a:buChar char="o"/>
+            </a:pPr>
+            <a:endParaRPr lang="en-US" dirty="0"/>
+          </a:p>
+        </p:txBody>
+      </p:sp>
+    </p:spTree>
+    <p:extLst>
+      <p:ext uri="{BB962C8B-B14F-4D97-AF65-F5344CB8AC3E}">
+        <p14:creationId xmlns:p14="http://schemas.microsoft.com/office/powerpoint/2010/main" val="3441598739"/>
+      </p:ext>
+    </p:extLst>
+  </p:cSld>
+  <p:clrMapOvr>
+    <a:masterClrMapping/>
+  </p:clrMapOvr>
+</p:sld>
+</file>
+
+<file path=ppt/slides/slide11.xml><?xml version="1.0" encoding="utf-8"?>
+<p:sld xmlns:a="http://schemas.openxmlformats.org/drawingml/2006/main" xmlns:r="http://schemas.openxmlformats.org/officeDocument/2006/relationships" xmlns:p="http://schemas.openxmlformats.org/presentationml/2006/main">
+  <p:cSld>
+    <p:spTree>
+      <p:nvGrpSpPr>
+        <p:cNvPr id="1" name=""/>
+        <p:cNvGrpSpPr/>
+        <p:nvPr/>
+      </p:nvGrpSpPr>
+      <p:grpSpPr>
+        <a:xfrm>
+          <a:off x="0" y="0"/>
+          <a:ext cx="0" cy="0"/>
+          <a:chOff x="0" y="0"/>
+          <a:chExt cx="0" cy="0"/>
+        </a:xfrm>
+      </p:grpSpPr>
+      <p:sp>
+        <p:nvSpPr>
+          <p:cNvPr id="2" name="Title 1">
+            <a:extLst>
+              <a:ext uri="{FF2B5EF4-FFF2-40B4-BE49-F238E27FC236}">
+                <a16:creationId xmlns:a16="http://schemas.microsoft.com/office/drawing/2014/main" id="{17FCE676-B97A-4026-9CC3-92147AE350AA}"/>
+              </a:ext>
+            </a:extLst>
+          </p:cNvPr>
+          <p:cNvSpPr>
+            <a:spLocks noGrp="1"/>
+          </p:cNvSpPr>
+          <p:nvPr>
+            <p:ph type="title"/>
+          </p:nvPr>
+        </p:nvSpPr>
+        <p:spPr/>
+        <p:txBody>
+          <a:bodyPr/>
+          <a:lstStyle/>
+          <a:p>
+            <a:r>
+              <a:rPr lang="en-US" dirty="0"/>
+              <a:t>Implementation</a:t>
+            </a:r>
+          </a:p>
+        </p:txBody>
+      </p:sp>
+      <p:sp>
+        <p:nvSpPr>
+          <p:cNvPr id="4" name="Date Placeholder 3">
+            <a:extLst>
+              <a:ext uri="{FF2B5EF4-FFF2-40B4-BE49-F238E27FC236}">
+                <a16:creationId xmlns:a16="http://schemas.microsoft.com/office/drawing/2014/main" id="{BD21AC86-E277-F55E-0BD6-9FDAA64B18F5}"/>
+              </a:ext>
+            </a:extLst>
+          </p:cNvPr>
+          <p:cNvSpPr>
+            <a:spLocks noGrp="1"/>
+          </p:cNvSpPr>
+          <p:nvPr>
+            <p:ph type="dt" sz="half" idx="2"/>
+          </p:nvPr>
+        </p:nvSpPr>
+        <p:spPr/>
+        <p:txBody>
+          <a:bodyPr/>
+          <a:lstStyle/>
+          <a:p>
+            <a:r>
+              <a:rPr lang="de-DE" dirty="0"/>
+              <a:t>3 JUN 24</a:t>
+            </a:r>
+            <a:endParaRPr lang="en-US" dirty="0"/>
+          </a:p>
+        </p:txBody>
+      </p:sp>
+      <p:sp>
+        <p:nvSpPr>
+          <p:cNvPr id="5" name="Footer Placeholder 4">
+            <a:extLst>
+              <a:ext uri="{FF2B5EF4-FFF2-40B4-BE49-F238E27FC236}">
+                <a16:creationId xmlns:a16="http://schemas.microsoft.com/office/drawing/2014/main" id="{AA0C739C-809C-F24B-7238-8062366C5308}"/>
+              </a:ext>
+            </a:extLst>
+          </p:cNvPr>
+          <p:cNvSpPr>
+            <a:spLocks noGrp="1"/>
+          </p:cNvSpPr>
+          <p:nvPr>
+            <p:ph type="ftr" sz="quarter" idx="3"/>
+          </p:nvPr>
+        </p:nvSpPr>
+        <p:spPr/>
+        <p:txBody>
+          <a:bodyPr/>
+          <a:lstStyle/>
+          <a:p>
+            <a:r>
+              <a:rPr lang="en-US"/>
+              <a:t>SIMULATION 10499</a:t>
+            </a:r>
+            <a:endParaRPr lang="en-US" dirty="0"/>
+          </a:p>
+        </p:txBody>
+      </p:sp>
+      <p:sp>
+        <p:nvSpPr>
+          <p:cNvPr id="6" name="Slide Number Placeholder 5">
+            <a:extLst>
+              <a:ext uri="{FF2B5EF4-FFF2-40B4-BE49-F238E27FC236}">
+                <a16:creationId xmlns:a16="http://schemas.microsoft.com/office/drawing/2014/main" id="{B3904964-B4F4-ED44-2388-52E3B1B70601}"/>
+              </a:ext>
+            </a:extLst>
+          </p:cNvPr>
+          <p:cNvSpPr>
+            <a:spLocks noGrp="1"/>
+          </p:cNvSpPr>
+          <p:nvPr>
+            <p:ph type="sldNum" sz="quarter" idx="4"/>
+          </p:nvPr>
+        </p:nvSpPr>
+        <p:spPr/>
+        <p:txBody>
+          <a:bodyPr/>
+          <a:lstStyle/>
+          <a:p>
+            <a:fld id="{48F63A3B-78C7-47BE-AE5E-E10140E04643}" type="slidenum">
+              <a:rPr lang="en-US" smtClean="0"/>
+              <a:pPr/>
+              <a:t>11</a:t>
+            </a:fld>
+            <a:endParaRPr lang="en-US" dirty="0"/>
+          </a:p>
+        </p:txBody>
+      </p:sp>
+      <p:sp>
+        <p:nvSpPr>
+          <p:cNvPr id="12" name="Content Placeholder 2">
+            <a:extLst>
+              <a:ext uri="{FF2B5EF4-FFF2-40B4-BE49-F238E27FC236}">
+                <a16:creationId xmlns:a16="http://schemas.microsoft.com/office/drawing/2014/main" id="{1A22B837-6A20-28AC-87AE-491CCCC6DEA9}"/>
+              </a:ext>
+            </a:extLst>
+          </p:cNvPr>
+          <p:cNvSpPr>
+            <a:spLocks noGrp="1"/>
+          </p:cNvSpPr>
+          <p:nvPr>
+            <p:ph sz="half" idx="10"/>
+          </p:nvPr>
+        </p:nvSpPr>
+        <p:spPr>
+          <a:xfrm>
+            <a:off x="2496000" y="1655409"/>
+            <a:ext cx="7200000" cy="5023181"/>
+          </a:xfrm>
+        </p:spPr>
+        <p:txBody>
+          <a:bodyPr anchor="ctr"/>
+          <a:lstStyle/>
+          <a:p>
+            <a:pPr marL="542925" indent="-447675">
+              <a:buClr>
+                <a:srgbClr val="00E47C"/>
+              </a:buClr>
+              <a:buFont typeface="Courier New" panose="02070309020205020404" pitchFamily="49" charset="0"/>
+              <a:buChar char="o"/>
+            </a:pPr>
+            <a:r>
+              <a:rPr lang="en-US" dirty="0"/>
+              <a:t>R programming language</a:t>
+            </a:r>
+          </a:p>
+          <a:p>
+            <a:pPr marL="542925" indent="-447675">
+              <a:buClr>
+                <a:srgbClr val="00E47C"/>
+              </a:buClr>
+              <a:buFont typeface="Courier New" panose="02070309020205020404" pitchFamily="49" charset="0"/>
+              <a:buChar char="o"/>
+            </a:pPr>
+            <a:endParaRPr lang="en-US" dirty="0"/>
+          </a:p>
+          <a:p>
+            <a:pPr marL="542925" indent="-447675">
+              <a:buClr>
+                <a:srgbClr val="00E47C"/>
+              </a:buClr>
+              <a:buFont typeface="Courier New" panose="02070309020205020404" pitchFamily="49" charset="0"/>
+              <a:buChar char="o"/>
+            </a:pPr>
+            <a:r>
+              <a:rPr lang="en-US" dirty="0">
+                <a:latin typeface="Verdana" panose="020B0604030504040204" pitchFamily="34" charset="0"/>
+                <a:ea typeface="Verdana" panose="020B0604030504040204" pitchFamily="34" charset="0"/>
+                <a:cs typeface="Verdana" panose="020B0604030504040204" pitchFamily="34" charset="0"/>
+              </a:rPr>
+              <a:t>survival</a:t>
+            </a:r>
+            <a:r>
+              <a:rPr lang="en-US" dirty="0"/>
+              <a:t> package ecosystem</a:t>
+            </a:r>
+          </a:p>
+          <a:p>
+            <a:pPr marL="542925" indent="-447675">
+              <a:buClr>
+                <a:srgbClr val="00E47C"/>
+              </a:buClr>
+              <a:buFont typeface="Courier New" panose="02070309020205020404" pitchFamily="49" charset="0"/>
+              <a:buChar char="o"/>
+            </a:pPr>
+            <a:endParaRPr lang="en-US" dirty="0"/>
+          </a:p>
+          <a:p>
+            <a:pPr marL="542925" indent="-447675">
+              <a:buClr>
+                <a:srgbClr val="00E47C"/>
+              </a:buClr>
+              <a:buFont typeface="Courier New" panose="02070309020205020404" pitchFamily="49" charset="0"/>
+              <a:buChar char="o"/>
+            </a:pPr>
+            <a:r>
+              <a:rPr lang="en-US" dirty="0"/>
+              <a:t>code is available on </a:t>
+            </a:r>
+            <a:r>
+              <a:rPr lang="en-US" dirty="0" err="1"/>
+              <a:t>github</a:t>
+            </a:r>
+            <a:endParaRPr lang="en-US" dirty="0"/>
+          </a:p>
+        </p:txBody>
+      </p:sp>
+    </p:spTree>
+    <p:extLst>
+      <p:ext uri="{BB962C8B-B14F-4D97-AF65-F5344CB8AC3E}">
+        <p14:creationId xmlns:p14="http://schemas.microsoft.com/office/powerpoint/2010/main" val="2461502498"/>
+      </p:ext>
+    </p:extLst>
+  </p:cSld>
+  <p:clrMapOvr>
+    <a:masterClrMapping/>
+  </p:clrMapOvr>
+</p:sld>
+</file>
+
+<file path=ppt/slides/slide12.xml><?xml version="1.0" encoding="utf-8"?>
+<p:sld xmlns:a="http://schemas.openxmlformats.org/drawingml/2006/main" xmlns:r="http://schemas.openxmlformats.org/officeDocument/2006/relationships" xmlns:p="http://schemas.openxmlformats.org/presentationml/2006/main">
+  <p:cSld>
+    <p:bg>
+      <p:bgPr>
+        <a:solidFill>
+          <a:srgbClr val="003229"/>
+        </a:solidFill>
+        <a:effectLst/>
+      </p:bgPr>
+    </p:bg>
+    <p:spTree>
+      <p:nvGrpSpPr>
+        <p:cNvPr id="1" name=""/>
+        <p:cNvGrpSpPr/>
+        <p:nvPr/>
+      </p:nvGrpSpPr>
+      <p:grpSpPr>
+        <a:xfrm>
+          <a:off x="0" y="0"/>
+          <a:ext cx="0" cy="0"/>
+          <a:chOff x="0" y="0"/>
+          <a:chExt cx="0" cy="0"/>
+        </a:xfrm>
+      </p:grpSpPr>
+      <p:pic>
+        <p:nvPicPr>
+          <p:cNvPr id="7" name="Graphic 6">
+            <a:extLst>
+              <a:ext uri="{FF2B5EF4-FFF2-40B4-BE49-F238E27FC236}">
+                <a16:creationId xmlns:a16="http://schemas.microsoft.com/office/drawing/2014/main" id="{92DBDBE9-6366-91DF-B0D9-659B68F2DF70}"/>
+              </a:ext>
+            </a:extLst>
+          </p:cNvPr>
+          <p:cNvPicPr>
+            <a:picLocks noChangeAspect="1"/>
+          </p:cNvPicPr>
+          <p:nvPr/>
+        </p:nvPicPr>
+        <p:blipFill>
+          <a:blip r:embed="rId2">
+            <a:extLst>
+              <a:ext uri="{96DAC541-7B7A-43D3-8B79-37D633B846F1}">
+                <asvg:svgBlip xmlns:asvg="http://schemas.microsoft.com/office/drawing/2016/SVG/main" r:embed="rId3"/>
+              </a:ext>
+            </a:extLst>
+          </a:blip>
+          <a:stretch>
+            <a:fillRect/>
+          </a:stretch>
+        </p:blipFill>
+        <p:spPr>
+          <a:xfrm>
+            <a:off x="7896000" y="3578714"/>
+            <a:ext cx="5683624" cy="3194406"/>
+          </a:xfrm>
+          <a:prstGeom prst="rect">
+            <a:avLst/>
+          </a:prstGeom>
+        </p:spPr>
+      </p:pic>
+      <p:sp>
+        <p:nvSpPr>
+          <p:cNvPr id="2" name="Title 1">
+            <a:extLst>
+              <a:ext uri="{FF2B5EF4-FFF2-40B4-BE49-F238E27FC236}">
+                <a16:creationId xmlns:a16="http://schemas.microsoft.com/office/drawing/2014/main" id="{EE6E169D-DD99-B8DB-440C-D2636E15030F}"/>
+              </a:ext>
+            </a:extLst>
+          </p:cNvPr>
+          <p:cNvSpPr>
+            <a:spLocks noGrp="1"/>
+          </p:cNvSpPr>
+          <p:nvPr>
+            <p:ph type="ctrTitle"/>
+          </p:nvPr>
+        </p:nvSpPr>
+        <p:spPr>
+          <a:xfrm>
+            <a:off x="1416000" y="3429000"/>
+            <a:ext cx="9360000" cy="2031266"/>
+          </a:xfrm>
+        </p:spPr>
+        <p:txBody>
+          <a:bodyPr/>
+          <a:lstStyle/>
+          <a:p>
+            <a:r>
+              <a:rPr lang="en-US" dirty="0">
+                <a:solidFill>
+                  <a:schemeClr val="bg1"/>
+                </a:solidFill>
+              </a:rPr>
+              <a:t>Thank you!</a:t>
+            </a:r>
+          </a:p>
+        </p:txBody>
+      </p:sp>
+      <p:sp>
+        <p:nvSpPr>
+          <p:cNvPr id="3" name="Subtitle 2">
+            <a:extLst>
+              <a:ext uri="{FF2B5EF4-FFF2-40B4-BE49-F238E27FC236}">
+                <a16:creationId xmlns:a16="http://schemas.microsoft.com/office/drawing/2014/main" id="{81D6E93F-68EA-938E-C669-C281E1934810}"/>
+              </a:ext>
+            </a:extLst>
+          </p:cNvPr>
+          <p:cNvSpPr>
+            <a:spLocks noGrp="1"/>
+          </p:cNvSpPr>
+          <p:nvPr>
+            <p:ph type="subTitle" idx="1"/>
+          </p:nvPr>
+        </p:nvSpPr>
+        <p:spPr>
+          <a:xfrm>
+            <a:off x="1416000" y="5460266"/>
+            <a:ext cx="9360000" cy="784477"/>
+          </a:xfrm>
+        </p:spPr>
+        <p:txBody>
+          <a:bodyPr/>
+          <a:lstStyle/>
+          <a:p>
+            <a:br>
+              <a:rPr lang="en-US" sz="2400" spc="0" dirty="0">
+                <a:solidFill>
+                  <a:srgbClr val="00E47C"/>
+                </a:solidFill>
+                <a:latin typeface="Everett" panose="020B0504000000000000" pitchFamily="34" charset="77"/>
+              </a:rPr>
+            </a:br>
+            <a:r>
+              <a:rPr lang="en-US" spc="0" dirty="0">
+                <a:solidFill>
+                  <a:srgbClr val="00E47C"/>
+                </a:solidFill>
+                <a:latin typeface="Everett" panose="020B0504000000000000" pitchFamily="34" charset="77"/>
+              </a:rPr>
+              <a:t>Postdoc Simulation CDS (10499)</a:t>
+            </a:r>
+          </a:p>
+        </p:txBody>
+      </p:sp>
+    </p:spTree>
+    <p:extLst>
+      <p:ext uri="{BB962C8B-B14F-4D97-AF65-F5344CB8AC3E}">
+        <p14:creationId xmlns:p14="http://schemas.microsoft.com/office/powerpoint/2010/main" val="2085588931"/>
+      </p:ext>
+    </p:extLst>
+  </p:cSld>
+  <p:clrMapOvr>
+    <a:masterClrMapping/>
+  </p:clrMapOvr>
+</p:sld>
+</file>
+
+<file path=ppt/slides/slide13.xml><?xml version="1.0" encoding="utf-8"?>
+<p:sld xmlns:a="http://schemas.openxmlformats.org/drawingml/2006/main" xmlns:r="http://schemas.openxmlformats.org/officeDocument/2006/relationships" xmlns:p="http://schemas.openxmlformats.org/presentationml/2006/main">
+  <p:cSld>
+    <p:spTree>
+      <p:nvGrpSpPr>
+        <p:cNvPr id="1" name=""/>
+        <p:cNvGrpSpPr/>
+        <p:nvPr/>
+      </p:nvGrpSpPr>
+      <p:grpSpPr>
+        <a:xfrm>
+          <a:off x="0" y="0"/>
+          <a:ext cx="0" cy="0"/>
+          <a:chOff x="0" y="0"/>
+          <a:chExt cx="0" cy="0"/>
+        </a:xfrm>
+      </p:grpSpPr>
+      <p:sp>
+        <p:nvSpPr>
+          <p:cNvPr id="2" name="Title 1">
+            <a:extLst>
+              <a:ext uri="{FF2B5EF4-FFF2-40B4-BE49-F238E27FC236}">
+                <a16:creationId xmlns:a16="http://schemas.microsoft.com/office/drawing/2014/main" id="{96D4C5C9-CAB7-280F-1FB4-1C2C590D7438}"/>
+              </a:ext>
+            </a:extLst>
+          </p:cNvPr>
+          <p:cNvSpPr>
+            <a:spLocks noGrp="1"/>
+          </p:cNvSpPr>
+          <p:nvPr>
+            <p:ph type="title"/>
+          </p:nvPr>
+        </p:nvSpPr>
+        <p:spPr/>
+        <p:txBody>
+          <a:bodyPr/>
+          <a:lstStyle/>
+          <a:p>
+            <a:r>
+              <a:rPr lang="en-US" dirty="0"/>
+              <a:t>References</a:t>
+            </a:r>
+          </a:p>
+        </p:txBody>
+      </p:sp>
+      <p:sp>
+        <p:nvSpPr>
+          <p:cNvPr id="3" name="Content Placeholder 2">
+            <a:extLst>
+              <a:ext uri="{FF2B5EF4-FFF2-40B4-BE49-F238E27FC236}">
+                <a16:creationId xmlns:a16="http://schemas.microsoft.com/office/drawing/2014/main" id="{F2AD2884-C2F8-2899-EBC8-4A3C32ED39E3}"/>
+              </a:ext>
+            </a:extLst>
+          </p:cNvPr>
+          <p:cNvSpPr>
+            <a:spLocks noGrp="1"/>
+          </p:cNvSpPr>
+          <p:nvPr>
+            <p:ph sz="half" idx="10"/>
+          </p:nvPr>
+        </p:nvSpPr>
+        <p:spPr/>
+        <p:txBody>
+          <a:bodyPr>
+            <a:normAutofit/>
+          </a:bodyPr>
+          <a:lstStyle/>
+          <a:p>
+            <a:pPr marL="514350" indent="-514350">
+              <a:buClr>
+                <a:srgbClr val="00E47C"/>
+              </a:buClr>
+              <a:buFont typeface="+mj-lt"/>
+              <a:buAutoNum type="arabicParenR"/>
+            </a:pPr>
+            <a:r>
+              <a:rPr lang="en-GB" sz="1600" dirty="0">
+                <a:latin typeface="Everett" panose="020B0504000000000000" pitchFamily="34" charset="77"/>
+              </a:rPr>
+              <a:t>Le-Rademacher JG, Peterson RA, </a:t>
+            </a:r>
+            <a:r>
+              <a:rPr lang="en-GB" sz="1600" dirty="0" err="1">
+                <a:latin typeface="Everett" panose="020B0504000000000000" pitchFamily="34" charset="77"/>
+              </a:rPr>
+              <a:t>Therneau</a:t>
+            </a:r>
+            <a:r>
+              <a:rPr lang="en-GB" sz="1600" dirty="0">
+                <a:latin typeface="Everett" panose="020B0504000000000000" pitchFamily="34" charset="77"/>
+              </a:rPr>
+              <a:t> TM, Sanford BL, Stone RM, </a:t>
+            </a:r>
+            <a:r>
+              <a:rPr lang="en-GB" sz="1600" dirty="0" err="1">
+                <a:latin typeface="Everett" panose="020B0504000000000000" pitchFamily="34" charset="77"/>
+              </a:rPr>
+              <a:t>Mandrekar</a:t>
+            </a:r>
+            <a:r>
+              <a:rPr lang="en-GB" sz="1600" dirty="0">
+                <a:latin typeface="Everett" panose="020B0504000000000000" pitchFamily="34" charset="77"/>
+              </a:rPr>
+              <a:t> SJ. Application of multi-state models in cancer clinical trials. Clin Trials. 2018 Oct; 15 (5):489-498.</a:t>
+            </a:r>
+          </a:p>
+          <a:p>
+            <a:pPr marL="514350" indent="-514350">
+              <a:buClr>
+                <a:srgbClr val="00E47C"/>
+              </a:buClr>
+              <a:buFont typeface="+mj-lt"/>
+              <a:buAutoNum type="arabicParenR"/>
+            </a:pPr>
+            <a:r>
+              <a:rPr lang="en-GB" sz="1600" dirty="0">
+                <a:latin typeface="Everett" panose="020B0504000000000000" pitchFamily="34" charset="77"/>
+              </a:rPr>
+              <a:t>Schoenfeld D (1981), The Asymptotic Properties of Nonparametric Tests for Comparing Survival Distributions. </a:t>
+            </a:r>
+            <a:r>
+              <a:rPr lang="en-GB" sz="1600" dirty="0" err="1">
+                <a:latin typeface="Everett" panose="020B0504000000000000" pitchFamily="34" charset="77"/>
+              </a:rPr>
+              <a:t>Biometrika</a:t>
+            </a:r>
+            <a:r>
+              <a:rPr lang="en-GB" sz="1600" dirty="0">
+                <a:latin typeface="Everett" panose="020B0504000000000000" pitchFamily="34" charset="77"/>
+              </a:rPr>
+              <a:t>, 68, 316-319.</a:t>
+            </a:r>
+          </a:p>
+          <a:p>
+            <a:pPr marL="514350" indent="-514350">
+              <a:buClr>
+                <a:srgbClr val="00E47C"/>
+              </a:buClr>
+              <a:buFont typeface="+mj-lt"/>
+              <a:buAutoNum type="arabicParenR"/>
+            </a:pPr>
+            <a:r>
+              <a:rPr lang="en-US" sz="1600" dirty="0">
+                <a:latin typeface="Everett" panose="020B0504000000000000" pitchFamily="34" charset="77"/>
+              </a:rPr>
+              <a:t>Lachin JM and Foulkes MA (1986), Evaluation of Sample Size and Power for Analyses of Survival with Allowance for Nonuniform Patient Entry, Losses to Follow-Up, Noncompliance, and Stratification. Biometrics, 42, 507-519.</a:t>
+            </a:r>
+          </a:p>
+          <a:p>
+            <a:pPr marL="514350" indent="-514350">
+              <a:buClr>
+                <a:srgbClr val="00E47C"/>
+              </a:buClr>
+              <a:buFont typeface="+mj-lt"/>
+              <a:buAutoNum type="arabicParenR"/>
+            </a:pPr>
+            <a:endParaRPr lang="en-US" sz="1600" dirty="0">
+              <a:latin typeface="Everett" panose="020B0504000000000000" pitchFamily="34" charset="77"/>
+            </a:endParaRPr>
+          </a:p>
+        </p:txBody>
+      </p:sp>
+      <p:sp>
+        <p:nvSpPr>
+          <p:cNvPr id="4" name="Date Placeholder 3">
+            <a:extLst>
+              <a:ext uri="{FF2B5EF4-FFF2-40B4-BE49-F238E27FC236}">
+                <a16:creationId xmlns:a16="http://schemas.microsoft.com/office/drawing/2014/main" id="{C598609B-D20B-ABC9-AF9B-7D333EF0632E}"/>
+              </a:ext>
+            </a:extLst>
+          </p:cNvPr>
+          <p:cNvSpPr>
+            <a:spLocks noGrp="1"/>
+          </p:cNvSpPr>
+          <p:nvPr>
+            <p:ph type="dt" sz="half" idx="2"/>
+          </p:nvPr>
+        </p:nvSpPr>
+        <p:spPr/>
+        <p:txBody>
+          <a:bodyPr/>
+          <a:lstStyle/>
+          <a:p>
+            <a:r>
+              <a:rPr lang="de-DE"/>
+              <a:t>3 JUN 24</a:t>
+            </a:r>
+            <a:endParaRPr lang="en-US" dirty="0"/>
+          </a:p>
+        </p:txBody>
+      </p:sp>
+      <p:sp>
+        <p:nvSpPr>
+          <p:cNvPr id="5" name="Footer Placeholder 4">
+            <a:extLst>
+              <a:ext uri="{FF2B5EF4-FFF2-40B4-BE49-F238E27FC236}">
+                <a16:creationId xmlns:a16="http://schemas.microsoft.com/office/drawing/2014/main" id="{7B26CB0F-F669-CFB5-BB41-BD61B724FEF9}"/>
+              </a:ext>
+            </a:extLst>
+          </p:cNvPr>
+          <p:cNvSpPr>
+            <a:spLocks noGrp="1"/>
+          </p:cNvSpPr>
+          <p:nvPr>
+            <p:ph type="ftr" sz="quarter" idx="3"/>
+          </p:nvPr>
+        </p:nvSpPr>
+        <p:spPr/>
+        <p:txBody>
+          <a:bodyPr/>
+          <a:lstStyle/>
+          <a:p>
+            <a:r>
+              <a:rPr lang="en-US"/>
+              <a:t>SIMULATION 10499</a:t>
+            </a:r>
+            <a:endParaRPr lang="en-US" dirty="0"/>
+          </a:p>
+        </p:txBody>
+      </p:sp>
+      <p:sp>
+        <p:nvSpPr>
+          <p:cNvPr id="6" name="Slide Number Placeholder 5">
+            <a:extLst>
+              <a:ext uri="{FF2B5EF4-FFF2-40B4-BE49-F238E27FC236}">
+                <a16:creationId xmlns:a16="http://schemas.microsoft.com/office/drawing/2014/main" id="{1205E74D-8D47-AFF0-D0F8-527246676DE8}"/>
+              </a:ext>
+            </a:extLst>
+          </p:cNvPr>
+          <p:cNvSpPr>
+            <a:spLocks noGrp="1"/>
+          </p:cNvSpPr>
+          <p:nvPr>
+            <p:ph type="sldNum" sz="quarter" idx="4"/>
+          </p:nvPr>
+        </p:nvSpPr>
+        <p:spPr/>
+        <p:txBody>
+          <a:bodyPr/>
+          <a:lstStyle/>
+          <a:p>
+            <a:fld id="{48F63A3B-78C7-47BE-AE5E-E10140E04643}" type="slidenum">
+              <a:rPr lang="en-US" smtClean="0"/>
+              <a:pPr/>
+              <a:t>13</a:t>
+            </a:fld>
+            <a:endParaRPr lang="en-US" dirty="0"/>
+          </a:p>
+        </p:txBody>
+      </p:sp>
+    </p:spTree>
+    <p:extLst>
+      <p:ext uri="{BB962C8B-B14F-4D97-AF65-F5344CB8AC3E}">
+        <p14:creationId xmlns:p14="http://schemas.microsoft.com/office/powerpoint/2010/main" val="2465733199"/>
+      </p:ext>
+    </p:extLst>
+  </p:cSld>
+  <p:clrMapOvr>
+    <a:masterClrMapping/>
+  </p:clrMapOvr>
+</p:sld>
+</file>
+
 <file path=ppt/slides/slide2.xml><?xml version="1.0" encoding="utf-8"?>
 <p:sld xmlns:a="http://schemas.openxmlformats.org/drawingml/2006/main" xmlns:r="http://schemas.openxmlformats.org/officeDocument/2006/relationships" xmlns:p="http://schemas.openxmlformats.org/presentationml/2006/main">
   <p:cSld>
@@ -4349,35 +5265,75 @@
             <p:ph sz="half" idx="10"/>
           </p:nvPr>
         </p:nvSpPr>
-        <p:spPr/>
-        <p:txBody>
-          <a:bodyPr/>
+        <p:spPr>
+          <a:xfrm>
+            <a:off x="3755999" y="1655409"/>
+            <a:ext cx="4680001" cy="5023181"/>
+          </a:xfrm>
+        </p:spPr>
+        <p:txBody>
+          <a:bodyPr anchor="ctr"/>
           <a:lstStyle/>
           <a:p>
+            <a:pPr marL="538163" indent="-449263">
+              <a:buClr>
+                <a:srgbClr val="00E47C"/>
+              </a:buClr>
+              <a:buFont typeface="Courier New" panose="02070309020205020404" pitchFamily="49" charset="0"/>
+              <a:buChar char="o"/>
+            </a:pPr>
             <a:r>
               <a:rPr lang="en-US" dirty="0"/>
-              <a:t>Premise</a:t>
-            </a:r>
-          </a:p>
-          <a:p>
+              <a:t>Aim</a:t>
+            </a:r>
+          </a:p>
+          <a:p>
+            <a:pPr marL="538163" indent="-449263">
+              <a:buClr>
+                <a:srgbClr val="00E47C"/>
+              </a:buClr>
+              <a:buFont typeface="Courier New" panose="02070309020205020404" pitchFamily="49" charset="0"/>
+              <a:buChar char="o"/>
+            </a:pPr>
             <a:r>
               <a:rPr lang="en-US" dirty="0"/>
-              <a:t>Hazard models</a:t>
-            </a:r>
-          </a:p>
-          <a:p>
+              <a:t>Background</a:t>
+            </a:r>
+          </a:p>
+          <a:p>
+            <a:pPr marL="538163" indent="-449263">
+              <a:buClr>
+                <a:srgbClr val="00E47C"/>
+              </a:buClr>
+              <a:buFont typeface="Courier New" panose="02070309020205020404" pitchFamily="49" charset="0"/>
+              <a:buChar char="o"/>
+            </a:pPr>
             <a:r>
               <a:rPr lang="en-US" dirty="0"/>
-              <a:t>Simulations</a:t>
-            </a:r>
-          </a:p>
-          <a:p>
+              <a:t>Simulation study</a:t>
+            </a:r>
+          </a:p>
+          <a:p>
+            <a:pPr marL="538163" indent="-449263">
+              <a:buClr>
+                <a:srgbClr val="00E47C"/>
+              </a:buClr>
+              <a:buFont typeface="Courier New" panose="02070309020205020404" pitchFamily="49" charset="0"/>
+              <a:buChar char="o"/>
+            </a:pPr>
             <a:r>
               <a:rPr lang="en-US" dirty="0"/>
-              <a:t>Comparison</a:t>
-            </a:r>
-          </a:p>
-          <a:p>
+              <a:t>Possible extensions</a:t>
+            </a:r>
+          </a:p>
+          <a:p>
+            <a:pPr>
+              <a:buClr>
+                <a:srgbClr val="00E47C"/>
+              </a:buClr>
+              <a:buFont typeface="Courier New" panose="02070309020205020404" pitchFamily="49" charset="0"/>
+              <a:buChar char="o"/>
+            </a:pPr>
             <a:endParaRPr lang="en-US" dirty="0"/>
           </a:p>
         </p:txBody>
@@ -4505,7 +5461,7 @@
           <p:cNvPr id="2" name="Title 1">
             <a:extLst>
               <a:ext uri="{FF2B5EF4-FFF2-40B4-BE49-F238E27FC236}">
-                <a16:creationId xmlns:a16="http://schemas.microsoft.com/office/drawing/2014/main" id="{5CAF4DF5-C90E-2B0A-0CAA-8C0B3E55E19B}"/>
+                <a16:creationId xmlns:a16="http://schemas.microsoft.com/office/drawing/2014/main" id="{17FCE676-B97A-4026-9CC3-92147AE350AA}"/>
               </a:ext>
             </a:extLst>
           </p:cNvPr>
@@ -4523,34 +5479,141 @@
           <a:p>
             <a:r>
               <a:rPr lang="en-US" dirty="0"/>
-              <a:t>Premise</a:t>
-            </a:r>
-          </a:p>
-        </p:txBody>
-      </p:sp>
-      <p:sp>
-        <p:nvSpPr>
-          <p:cNvPr id="4" name="Date Placeholder 3">
-            <a:extLst>
-              <a:ext uri="{FF2B5EF4-FFF2-40B4-BE49-F238E27FC236}">
-                <a16:creationId xmlns:a16="http://schemas.microsoft.com/office/drawing/2014/main" id="{BD18978C-FEA2-C1D5-0FA5-0A74ED639669}"/>
-              </a:ext>
-            </a:extLst>
-          </p:cNvPr>
-          <p:cNvSpPr>
-            <a:spLocks noGrp="1"/>
-          </p:cNvSpPr>
-          <p:nvPr>
-            <p:ph type="dt" sz="half" idx="2"/>
+              <a:t>Aim</a:t>
+            </a:r>
+          </a:p>
+        </p:txBody>
+      </p:sp>
+      <p:sp>
+        <p:nvSpPr>
+          <p:cNvPr id="3" name="Content Placeholder 2">
+            <a:extLst>
+              <a:ext uri="{FF2B5EF4-FFF2-40B4-BE49-F238E27FC236}">
+                <a16:creationId xmlns:a16="http://schemas.microsoft.com/office/drawing/2014/main" id="{3EB3F950-1632-18CF-C3B8-1AEB5BC53B0D}"/>
+              </a:ext>
+            </a:extLst>
+          </p:cNvPr>
+          <p:cNvSpPr>
+            <a:spLocks noGrp="1"/>
+          </p:cNvSpPr>
+          <p:nvPr>
+            <p:ph sz="half" idx="10"/>
           </p:nvPr>
         </p:nvSpPr>
         <p:spPr>
-          <a:xfrm rot="5400000">
-            <a:off x="-2250791" y="3107399"/>
-            <a:ext cx="5856571" cy="540000"/>
+          <a:xfrm>
+            <a:off x="2496000" y="1655409"/>
+            <a:ext cx="7200000" cy="5023181"/>
           </a:xfrm>
         </p:spPr>
         <p:txBody>
+          <a:bodyPr anchor="ctr"/>
+          <a:lstStyle/>
+          <a:p>
+            <a:pPr marL="603250" indent="-514350">
+              <a:buClr>
+                <a:srgbClr val="00E47C"/>
+              </a:buClr>
+              <a:buFont typeface="Courier New" panose="02070309020205020404" pitchFamily="49" charset="0"/>
+              <a:buChar char="o"/>
+            </a:pPr>
+            <a:r>
+              <a:rPr lang="en-US" dirty="0"/>
+              <a:t>Replicate, </a:t>
+            </a:r>
+            <a:r>
+              <a:rPr lang="en-US" i="1" dirty="0"/>
+              <a:t>in-silico</a:t>
+            </a:r>
+            <a:r>
+              <a:rPr lang="en-US" dirty="0"/>
+              <a:t>, primary endpoint from a clinical trial</a:t>
+            </a:r>
+          </a:p>
+          <a:p>
+            <a:pPr marL="603250" indent="-514350">
+              <a:buClr>
+                <a:srgbClr val="00E47C"/>
+              </a:buClr>
+              <a:buFont typeface="Courier New" panose="02070309020205020404" pitchFamily="49" charset="0"/>
+              <a:buChar char="o"/>
+            </a:pPr>
+            <a:endParaRPr lang="en-US" dirty="0"/>
+          </a:p>
+          <a:p>
+            <a:pPr marL="603250" indent="-514350">
+              <a:buClr>
+                <a:srgbClr val="00E47C"/>
+              </a:buClr>
+              <a:buFont typeface="Courier New" panose="02070309020205020404" pitchFamily="49" charset="0"/>
+              <a:buChar char="o"/>
+            </a:pPr>
+            <a:r>
+              <a:rPr lang="en-US" dirty="0"/>
+              <a:t>Estimate the sample size for the </a:t>
+            </a:r>
+            <a:r>
+              <a:rPr lang="en-US" i="1" dirty="0"/>
+              <a:t>in-silico</a:t>
+            </a:r>
+            <a:r>
+              <a:rPr lang="en-US" dirty="0"/>
+              <a:t> clinical trial</a:t>
+            </a:r>
+          </a:p>
+          <a:p>
+            <a:pPr marL="603250" indent="-514350">
+              <a:buClr>
+                <a:srgbClr val="00E47C"/>
+              </a:buClr>
+              <a:buFont typeface="Courier New" panose="02070309020205020404" pitchFamily="49" charset="0"/>
+              <a:buChar char="o"/>
+            </a:pPr>
+            <a:endParaRPr lang="en-US" dirty="0"/>
+          </a:p>
+          <a:p>
+            <a:pPr marL="603250" indent="-514350">
+              <a:buClr>
+                <a:srgbClr val="00E47C"/>
+              </a:buClr>
+              <a:buFont typeface="Courier New" panose="02070309020205020404" pitchFamily="49" charset="0"/>
+              <a:buChar char="o"/>
+            </a:pPr>
+            <a:r>
+              <a:rPr lang="en-US" dirty="0"/>
+              <a:t>Test two different survival models</a:t>
+            </a:r>
+          </a:p>
+          <a:p>
+            <a:pPr>
+              <a:buClr>
+                <a:srgbClr val="00E47C"/>
+              </a:buClr>
+              <a:buFont typeface="Courier New" panose="02070309020205020404" pitchFamily="49" charset="0"/>
+              <a:buChar char="o"/>
+            </a:pPr>
+            <a:endParaRPr lang="en-US" dirty="0"/>
+          </a:p>
+        </p:txBody>
+      </p:sp>
+      <p:sp>
+        <p:nvSpPr>
+          <p:cNvPr id="4" name="Date Placeholder 3">
+            <a:extLst>
+              <a:ext uri="{FF2B5EF4-FFF2-40B4-BE49-F238E27FC236}">
+                <a16:creationId xmlns:a16="http://schemas.microsoft.com/office/drawing/2014/main" id="{BD21AC86-E277-F55E-0BD6-9FDAA64B18F5}"/>
+              </a:ext>
+            </a:extLst>
+          </p:cNvPr>
+          <p:cNvSpPr>
+            <a:spLocks noGrp="1"/>
+          </p:cNvSpPr>
+          <p:nvPr>
+            <p:ph type="dt" sz="half" idx="2"/>
+          </p:nvPr>
+        </p:nvSpPr>
+        <p:spPr/>
+        <p:txBody>
           <a:bodyPr/>
           <a:lstStyle/>
           <a:p>
@@ -4567,7 +5630,7 @@
           <p:cNvPr id="5" name="Footer Placeholder 4">
             <a:extLst>
               <a:ext uri="{FF2B5EF4-FFF2-40B4-BE49-F238E27FC236}">
-                <a16:creationId xmlns:a16="http://schemas.microsoft.com/office/drawing/2014/main" id="{50FECC4C-D60F-8AA2-EDD6-1205EC73E5B5}"/>
+                <a16:creationId xmlns:a16="http://schemas.microsoft.com/office/drawing/2014/main" id="{AA0C739C-809C-F24B-7238-8062366C5308}"/>
               </a:ext>
             </a:extLst>
           </p:cNvPr>
@@ -4578,12 +5641,7 @@
             <p:ph type="ftr" sz="quarter" idx="3"/>
           </p:nvPr>
         </p:nvSpPr>
-        <p:spPr>
-          <a:xfrm rot="16200000">
-            <a:off x="9552505" y="4073685"/>
-            <a:ext cx="3924000" cy="540000"/>
-          </a:xfrm>
-        </p:spPr>
+        <p:spPr/>
         <p:txBody>
           <a:bodyPr/>
           <a:lstStyle/>
@@ -4601,7 +5659,7 @@
           <p:cNvPr id="6" name="Slide Number Placeholder 5">
             <a:extLst>
               <a:ext uri="{FF2B5EF4-FFF2-40B4-BE49-F238E27FC236}">
-                <a16:creationId xmlns:a16="http://schemas.microsoft.com/office/drawing/2014/main" id="{D707A01A-3BF7-F38E-9CE0-B758E9ED42FC}"/>
+                <a16:creationId xmlns:a16="http://schemas.microsoft.com/office/drawing/2014/main" id="{B3904964-B4F4-ED44-2388-52E3B1B70601}"/>
               </a:ext>
             </a:extLst>
           </p:cNvPr>
@@ -4612,63 +5670,24 @@
             <p:ph type="sldNum" sz="quarter" idx="4"/>
           </p:nvPr>
         </p:nvSpPr>
-        <p:spPr>
-          <a:xfrm>
-            <a:off x="11154506" y="572191"/>
-            <a:ext cx="629999" cy="540000"/>
-          </a:xfrm>
-        </p:spPr>
+        <p:spPr/>
         <p:txBody>
           <a:bodyPr/>
           <a:lstStyle/>
           <a:p>
             <a:fld id="{48F63A3B-78C7-47BE-AE5E-E10140E04643}" type="slidenum">
               <a:rPr lang="en-US" smtClean="0"/>
+              <a:pPr/>
               <a:t>3</a:t>
             </a:fld>
             <a:endParaRPr lang="en-US" dirty="0"/>
           </a:p>
         </p:txBody>
       </p:sp>
-      <p:pic>
-        <p:nvPicPr>
-          <p:cNvPr id="15" name="Content Placeholder 14">
-            <a:extLst>
-              <a:ext uri="{FF2B5EF4-FFF2-40B4-BE49-F238E27FC236}">
-                <a16:creationId xmlns:a16="http://schemas.microsoft.com/office/drawing/2014/main" id="{069259A0-F283-E562-9B9B-38746DA7E395}"/>
-              </a:ext>
-            </a:extLst>
-          </p:cNvPr>
-          <p:cNvPicPr>
-            <a:picLocks noGrp="1" noChangeAspect="1"/>
-          </p:cNvPicPr>
-          <p:nvPr>
-            <p:ph sz="half" idx="10"/>
-          </p:nvPr>
-        </p:nvPicPr>
-        <p:blipFill>
-          <a:blip r:embed="rId2">
-            <a:extLst>
-              <a:ext uri="{96DAC541-7B7A-43D3-8B79-37D633B846F1}">
-                <asvg:svgBlip xmlns:asvg="http://schemas.microsoft.com/office/drawing/2016/SVG/main" r:embed="rId3"/>
-              </a:ext>
-            </a:extLst>
-          </a:blip>
-          <a:stretch>
-            <a:fillRect/>
-          </a:stretch>
-        </p:blipFill>
-        <p:spPr>
-          <a:xfrm>
-            <a:off x="3042366" y="1504973"/>
-            <a:ext cx="6107267" cy="5022850"/>
-          </a:xfrm>
-        </p:spPr>
-      </p:pic>
     </p:spTree>
     <p:extLst>
       <p:ext uri="{BB962C8B-B14F-4D97-AF65-F5344CB8AC3E}">
-        <p14:creationId xmlns:p14="http://schemas.microsoft.com/office/powerpoint/2010/main" val="768789475"/>
+        <p14:creationId xmlns:p14="http://schemas.microsoft.com/office/powerpoint/2010/main" val="3536493926"/>
       </p:ext>
     </p:extLst>
   </p:cSld>
@@ -4700,7 +5719,7 @@
           <p:cNvPr id="2" name="Title 1">
             <a:extLst>
               <a:ext uri="{FF2B5EF4-FFF2-40B4-BE49-F238E27FC236}">
-                <a16:creationId xmlns:a16="http://schemas.microsoft.com/office/drawing/2014/main" id="{17FCE676-B97A-4026-9CC3-92147AE350AA}"/>
+                <a16:creationId xmlns:a16="http://schemas.microsoft.com/office/drawing/2014/main" id="{5CAF4DF5-C90E-2B0A-0CAA-8C0B3E55E19B}"/>
               </a:ext>
             </a:extLst>
           </p:cNvPr>
@@ -4718,66 +5737,74 @@
           <a:p>
             <a:r>
               <a:rPr lang="en-US" dirty="0"/>
-              <a:t>Hazard models</a:t>
-            </a:r>
-          </a:p>
-        </p:txBody>
-      </p:sp>
-      <p:sp>
-        <p:nvSpPr>
-          <p:cNvPr id="3" name="Content Placeholder 2">
-            <a:extLst>
-              <a:ext uri="{FF2B5EF4-FFF2-40B4-BE49-F238E27FC236}">
-                <a16:creationId xmlns:a16="http://schemas.microsoft.com/office/drawing/2014/main" id="{3EB3F950-1632-18CF-C3B8-1AEB5BC53B0D}"/>
-              </a:ext>
-            </a:extLst>
-          </p:cNvPr>
-          <p:cNvSpPr>
-            <a:spLocks noGrp="1"/>
-          </p:cNvSpPr>
-          <p:nvPr>
-            <p:ph sz="half" idx="10"/>
-          </p:nvPr>
-        </p:nvSpPr>
-        <p:spPr/>
+              <a:t>Background</a:t>
+            </a:r>
+          </a:p>
+        </p:txBody>
+      </p:sp>
+      <p:sp>
+        <p:nvSpPr>
+          <p:cNvPr id="4" name="Date Placeholder 3">
+            <a:extLst>
+              <a:ext uri="{FF2B5EF4-FFF2-40B4-BE49-F238E27FC236}">
+                <a16:creationId xmlns:a16="http://schemas.microsoft.com/office/drawing/2014/main" id="{BD18978C-FEA2-C1D5-0FA5-0A74ED639669}"/>
+              </a:ext>
+            </a:extLst>
+          </p:cNvPr>
+          <p:cNvSpPr>
+            <a:spLocks noGrp="1"/>
+          </p:cNvSpPr>
+          <p:nvPr>
+            <p:ph type="dt" sz="half" idx="2"/>
+          </p:nvPr>
+        </p:nvSpPr>
+        <p:spPr>
+          <a:xfrm rot="5400000">
+            <a:off x="-2250791" y="3107399"/>
+            <a:ext cx="5856571" cy="540000"/>
+          </a:xfrm>
+        </p:spPr>
         <p:txBody>
           <a:bodyPr/>
           <a:lstStyle/>
           <a:p>
             <a:r>
-              <a:rPr lang="en-US" dirty="0"/>
-              <a:t>Weibull vs Royston-Parmar spline</a:t>
-            </a:r>
-          </a:p>
-          <a:p>
+              <a:rPr lang="de-DE"/>
+              <a:t>3 JUN 24</a:t>
+            </a:r>
             <a:endParaRPr lang="en-US" dirty="0"/>
           </a:p>
         </p:txBody>
       </p:sp>
       <p:sp>
         <p:nvSpPr>
-          <p:cNvPr id="4" name="Date Placeholder 3">
-            <a:extLst>
-              <a:ext uri="{FF2B5EF4-FFF2-40B4-BE49-F238E27FC236}">
-                <a16:creationId xmlns:a16="http://schemas.microsoft.com/office/drawing/2014/main" id="{BD21AC86-E277-F55E-0BD6-9FDAA64B18F5}"/>
-              </a:ext>
-            </a:extLst>
-          </p:cNvPr>
-          <p:cNvSpPr>
-            <a:spLocks noGrp="1"/>
-          </p:cNvSpPr>
-          <p:nvPr>
-            <p:ph type="dt" sz="half" idx="2"/>
-          </p:nvPr>
-        </p:nvSpPr>
-        <p:spPr/>
+          <p:cNvPr id="5" name="Footer Placeholder 4">
+            <a:extLst>
+              <a:ext uri="{FF2B5EF4-FFF2-40B4-BE49-F238E27FC236}">
+                <a16:creationId xmlns:a16="http://schemas.microsoft.com/office/drawing/2014/main" id="{50FECC4C-D60F-8AA2-EDD6-1205EC73E5B5}"/>
+              </a:ext>
+            </a:extLst>
+          </p:cNvPr>
+          <p:cNvSpPr>
+            <a:spLocks noGrp="1"/>
+          </p:cNvSpPr>
+          <p:nvPr>
+            <p:ph type="ftr" sz="quarter" idx="3"/>
+          </p:nvPr>
+        </p:nvSpPr>
+        <p:spPr>
+          <a:xfrm rot="16200000">
+            <a:off x="9552505" y="4073685"/>
+            <a:ext cx="3924000" cy="540000"/>
+          </a:xfrm>
+        </p:spPr>
         <p:txBody>
           <a:bodyPr/>
           <a:lstStyle/>
           <a:p>
             <a:r>
-              <a:rPr lang="de-DE"/>
-              <a:t>3 JUN 24</a:t>
+              <a:rPr lang="en-US"/>
+              <a:t>SIMULATION 10499</a:t>
             </a:r>
             <a:endParaRPr lang="en-US" dirty="0"/>
           </a:p>
@@ -4785,57 +5812,32 @@
       </p:sp>
       <p:sp>
         <p:nvSpPr>
-          <p:cNvPr id="5" name="Footer Placeholder 4">
-            <a:extLst>
-              <a:ext uri="{FF2B5EF4-FFF2-40B4-BE49-F238E27FC236}">
-                <a16:creationId xmlns:a16="http://schemas.microsoft.com/office/drawing/2014/main" id="{AA0C739C-809C-F24B-7238-8062366C5308}"/>
-              </a:ext>
-            </a:extLst>
-          </p:cNvPr>
-          <p:cNvSpPr>
-            <a:spLocks noGrp="1"/>
-          </p:cNvSpPr>
-          <p:nvPr>
-            <p:ph type="ftr" sz="quarter" idx="3"/>
-          </p:nvPr>
-        </p:nvSpPr>
-        <p:spPr/>
+          <p:cNvPr id="6" name="Slide Number Placeholder 5">
+            <a:extLst>
+              <a:ext uri="{FF2B5EF4-FFF2-40B4-BE49-F238E27FC236}">
+                <a16:creationId xmlns:a16="http://schemas.microsoft.com/office/drawing/2014/main" id="{D707A01A-3BF7-F38E-9CE0-B758E9ED42FC}"/>
+              </a:ext>
+            </a:extLst>
+          </p:cNvPr>
+          <p:cNvSpPr>
+            <a:spLocks noGrp="1"/>
+          </p:cNvSpPr>
+          <p:nvPr>
+            <p:ph type="sldNum" sz="quarter" idx="4"/>
+          </p:nvPr>
+        </p:nvSpPr>
+        <p:spPr>
+          <a:xfrm>
+            <a:off x="11154506" y="572191"/>
+            <a:ext cx="629999" cy="540000"/>
+          </a:xfrm>
+        </p:spPr>
         <p:txBody>
           <a:bodyPr/>
           <a:lstStyle/>
           <a:p>
-            <a:r>
-              <a:rPr lang="en-US"/>
-              <a:t>SIMULATION 10499</a:t>
-            </a:r>
-            <a:endParaRPr lang="en-US" dirty="0"/>
-          </a:p>
-        </p:txBody>
-      </p:sp>
-      <p:sp>
-        <p:nvSpPr>
-          <p:cNvPr id="6" name="Slide Number Placeholder 5">
-            <a:extLst>
-              <a:ext uri="{FF2B5EF4-FFF2-40B4-BE49-F238E27FC236}">
-                <a16:creationId xmlns:a16="http://schemas.microsoft.com/office/drawing/2014/main" id="{B3904964-B4F4-ED44-2388-52E3B1B70601}"/>
-              </a:ext>
-            </a:extLst>
-          </p:cNvPr>
-          <p:cNvSpPr>
-            <a:spLocks noGrp="1"/>
-          </p:cNvSpPr>
-          <p:nvPr>
-            <p:ph type="sldNum" sz="quarter" idx="4"/>
-          </p:nvPr>
-        </p:nvSpPr>
-        <p:spPr/>
-        <p:txBody>
-          <a:bodyPr/>
-          <a:lstStyle/>
-          <a:p>
             <a:fld id="{48F63A3B-78C7-47BE-AE5E-E10140E04643}" type="slidenum">
               <a:rPr lang="en-US" smtClean="0"/>
-              <a:pPr/>
               <a:t>4</a:t>
             </a:fld>
             <a:endParaRPr lang="en-US" dirty="0"/>
@@ -4844,17 +5846,19 @@
       </p:sp>
       <p:pic>
         <p:nvPicPr>
-          <p:cNvPr id="8" name="Graphic 7">
-            <a:extLst>
-              <a:ext uri="{FF2B5EF4-FFF2-40B4-BE49-F238E27FC236}">
-                <a16:creationId xmlns:a16="http://schemas.microsoft.com/office/drawing/2014/main" id="{D6E384F1-F1D5-8AB9-9B21-661EFBC68B5B}"/>
+          <p:cNvPr id="15" name="Content Placeholder 14">
+            <a:extLst>
+              <a:ext uri="{FF2B5EF4-FFF2-40B4-BE49-F238E27FC236}">
+                <a16:creationId xmlns:a16="http://schemas.microsoft.com/office/drawing/2014/main" id="{069259A0-F283-E562-9B9B-38746DA7E395}"/>
               </a:ext>
             </a:extLst>
           </p:cNvPr>
           <p:cNvPicPr>
-            <a:picLocks noChangeAspect="1"/>
+            <a:picLocks noGrp="1" noChangeAspect="1"/>
           </p:cNvPicPr>
-          <p:nvPr/>
+          <p:nvPr>
+            <p:ph sz="half" idx="10"/>
+          </p:nvPr>
         </p:nvPicPr>
         <p:blipFill>
           <a:blip r:embed="rId2">
@@ -4870,18 +5874,367 @@
         </p:blipFill>
         <p:spPr>
           <a:xfrm>
-            <a:off x="3575999" y="2381685"/>
-            <a:ext cx="5040000" cy="4145088"/>
+            <a:off x="1416000" y="1504973"/>
+            <a:ext cx="6107267" cy="5022850"/>
           </a:xfrm>
-          <a:prstGeom prst="rect">
-            <a:avLst/>
-          </a:prstGeom>
         </p:spPr>
       </p:pic>
+      <mc:AlternateContent xmlns:mc="http://schemas.openxmlformats.org/markup-compatibility/2006">
+        <mc:Choice xmlns:a14="http://schemas.microsoft.com/office/drawing/2010/main" Requires="a14">
+          <p:sp>
+            <p:nvSpPr>
+              <p:cNvPr id="3" name="TextBox 2">
+                <a:extLst>
+                  <a:ext uri="{FF2B5EF4-FFF2-40B4-BE49-F238E27FC236}">
+                    <a16:creationId xmlns:a16="http://schemas.microsoft.com/office/drawing/2014/main" id="{065FE533-6C3D-DA1A-A0F7-164BB45DE410}"/>
+                  </a:ext>
+                </a:extLst>
+              </p:cNvPr>
+              <p:cNvSpPr txBox="1"/>
+              <p:nvPr/>
+            </p:nvSpPr>
+            <p:spPr>
+              <a:xfrm>
+                <a:off x="7757856" y="2381685"/>
+                <a:ext cx="3018143" cy="3693319"/>
+              </a:xfrm>
+              <a:prstGeom prst="rect">
+                <a:avLst/>
+              </a:prstGeom>
+              <a:noFill/>
+            </p:spPr>
+            <p:txBody>
+              <a:bodyPr wrap="square" rtlCol="0">
+                <a:spAutoFit/>
+              </a:bodyPr>
+              <a:lstStyle/>
+              <a:p>
+                <a:pPr marL="285750" indent="-285750">
+                  <a:buFont typeface="Arial" panose="020B0604020202020204" pitchFamily="34" charset="0"/>
+                  <a:buChar char="•"/>
+                </a:pPr>
+                <a:r>
+                  <a:rPr lang="en-GB" b="0" i="0" dirty="0">
+                    <a:solidFill>
+                      <a:schemeClr val="tx1">
+                        <a:lumMod val="95000"/>
+                        <a:lumOff val="5000"/>
+                      </a:schemeClr>
+                    </a:solidFill>
+                    <a:effectLst/>
+                    <a:latin typeface="Didot" panose="02000503000000020003" pitchFamily="2" charset="-79"/>
+                    <a:cs typeface="Didot" panose="02000503000000020003" pitchFamily="2" charset="-79"/>
+                  </a:rPr>
+                  <a:t>Derived from the CALGB </a:t>
+                </a:r>
+                <a14:m>
+                  <m:oMath xmlns:m="http://schemas.openxmlformats.org/officeDocument/2006/math">
+                    <m:r>
+                      <a:rPr lang="en-GB" b="0" i="1" dirty="0" smtClean="0">
+                        <a:solidFill>
+                          <a:schemeClr val="tx1">
+                            <a:lumMod val="95000"/>
+                            <a:lumOff val="5000"/>
+                          </a:schemeClr>
+                        </a:solidFill>
+                        <a:effectLst/>
+                        <a:latin typeface="Cambria Math" panose="02040503050406030204" pitchFamily="18" charset="0"/>
+                        <a:cs typeface="Didot" panose="02000503000000020003" pitchFamily="2" charset="-79"/>
+                      </a:rPr>
+                      <m:t>10603</m:t>
+                    </m:r>
+                  </m:oMath>
+                </a14:m>
+                <a:r>
+                  <a:rPr lang="en-GB" b="0" i="0" dirty="0">
+                    <a:solidFill>
+                      <a:schemeClr val="tx1">
+                        <a:lumMod val="95000"/>
+                        <a:lumOff val="5000"/>
+                      </a:schemeClr>
+                    </a:solidFill>
+                    <a:effectLst/>
+                    <a:latin typeface="Didot" panose="02000503000000020003" pitchFamily="2" charset="-79"/>
+                    <a:cs typeface="Didot" panose="02000503000000020003" pitchFamily="2" charset="-79"/>
+                  </a:rPr>
+                  <a:t> trial</a:t>
+                </a:r>
+              </a:p>
+              <a:p>
+                <a:pPr marL="285750" indent="-285750">
+                  <a:buFont typeface="Arial" panose="020B0604020202020204" pitchFamily="34" charset="0"/>
+                  <a:buChar char="•"/>
+                </a:pPr>
+                <a:endParaRPr lang="en-GB" dirty="0">
+                  <a:solidFill>
+                    <a:schemeClr val="tx1">
+                      <a:lumMod val="95000"/>
+                      <a:lumOff val="5000"/>
+                    </a:schemeClr>
+                  </a:solidFill>
+                  <a:latin typeface="Didot" panose="02000503000000020003" pitchFamily="2" charset="-79"/>
+                  <a:cs typeface="Didot" panose="02000503000000020003" pitchFamily="2" charset="-79"/>
+                </a:endParaRPr>
+              </a:p>
+              <a:p>
+                <a:pPr marL="285750" indent="-285750">
+                  <a:buFont typeface="Arial" panose="020B0604020202020204" pitchFamily="34" charset="0"/>
+                  <a:buChar char="•"/>
+                </a:pPr>
+                <a14:m>
+                  <m:oMath xmlns:m="http://schemas.openxmlformats.org/officeDocument/2006/math">
+                    <m:r>
+                      <a:rPr lang="en-GB" i="1" dirty="0" smtClean="0">
+                        <a:solidFill>
+                          <a:schemeClr val="tx1">
+                            <a:lumMod val="95000"/>
+                            <a:lumOff val="5000"/>
+                          </a:schemeClr>
+                        </a:solidFill>
+                        <a:latin typeface="Cambria Math" panose="02040503050406030204" pitchFamily="18" charset="0"/>
+                        <a:cs typeface="Didot" panose="02000503000000020003" pitchFamily="2" charset="-79"/>
+                      </a:rPr>
+                      <m:t>646</m:t>
+                    </m:r>
+                  </m:oMath>
+                </a14:m>
+                <a:r>
+                  <a:rPr lang="en-GB" dirty="0">
+                    <a:solidFill>
+                      <a:schemeClr val="tx1">
+                        <a:lumMod val="95000"/>
+                        <a:lumOff val="5000"/>
+                      </a:schemeClr>
+                    </a:solidFill>
+                    <a:latin typeface="Didot" panose="02000503000000020003" pitchFamily="2" charset="-79"/>
+                    <a:cs typeface="Didot" panose="02000503000000020003" pitchFamily="2" charset="-79"/>
+                  </a:rPr>
+                  <a:t> patient,</a:t>
+                </a:r>
+                <a:br>
+                  <a:rPr lang="en-GB" dirty="0">
+                    <a:solidFill>
+                      <a:schemeClr val="tx1">
+                        <a:lumMod val="95000"/>
+                        <a:lumOff val="5000"/>
+                      </a:schemeClr>
+                    </a:solidFill>
+                    <a:latin typeface="Didot" panose="02000503000000020003" pitchFamily="2" charset="-79"/>
+                    <a:cs typeface="Didot" panose="02000503000000020003" pitchFamily="2" charset="-79"/>
+                  </a:rPr>
+                </a:br>
+                <a:r>
+                  <a:rPr lang="en-GB" dirty="0">
+                    <a:solidFill>
+                      <a:schemeClr val="tx1">
+                        <a:lumMod val="95000"/>
+                        <a:lumOff val="5000"/>
+                      </a:schemeClr>
+                    </a:solidFill>
+                    <a:latin typeface="Didot" panose="02000503000000020003" pitchFamily="2" charset="-79"/>
+                    <a:cs typeface="Didot" panose="02000503000000020003" pitchFamily="2" charset="-79"/>
+                  </a:rPr>
+                  <a:t>overall survival</a:t>
+                </a:r>
+              </a:p>
+              <a:p>
+                <a:pPr marL="285750" indent="-285750">
+                  <a:buFont typeface="Arial" panose="020B0604020202020204" pitchFamily="34" charset="0"/>
+                  <a:buChar char="•"/>
+                </a:pPr>
+                <a:endParaRPr lang="en-GB" b="0" i="0" dirty="0">
+                  <a:solidFill>
+                    <a:schemeClr val="tx1">
+                      <a:lumMod val="95000"/>
+                      <a:lumOff val="5000"/>
+                    </a:schemeClr>
+                  </a:solidFill>
+                  <a:effectLst/>
+                  <a:latin typeface="Didot" panose="02000503000000020003" pitchFamily="2" charset="-79"/>
+                  <a:cs typeface="Didot" panose="02000503000000020003" pitchFamily="2" charset="-79"/>
+                </a:endParaRPr>
+              </a:p>
+              <a:p>
+                <a:pPr marL="285750" indent="-285750">
+                  <a:buFont typeface="Arial" panose="020B0604020202020204" pitchFamily="34" charset="0"/>
+                  <a:buChar char="•"/>
+                </a:pPr>
+                <a:r>
+                  <a:rPr lang="en-GB" dirty="0">
+                    <a:solidFill>
+                      <a:schemeClr val="tx1">
+                        <a:lumMod val="95000"/>
+                        <a:lumOff val="5000"/>
+                      </a:schemeClr>
+                    </a:solidFill>
+                    <a:latin typeface="Didot" panose="02000503000000020003" pitchFamily="2" charset="-79"/>
+                    <a:cs typeface="Didot" panose="02000503000000020003" pitchFamily="2" charset="-79"/>
+                  </a:rPr>
+                  <a:t>Focus: acute myeloid </a:t>
+                </a:r>
+                <a:r>
+                  <a:rPr lang="en-US" dirty="0">
+                    <a:solidFill>
+                      <a:schemeClr val="tx1">
+                        <a:lumMod val="95000"/>
+                        <a:lumOff val="5000"/>
+                      </a:schemeClr>
+                    </a:solidFill>
+                    <a:latin typeface="Didot" panose="02000503000000020003" pitchFamily="2" charset="-79"/>
+                    <a:cs typeface="Didot" panose="02000503000000020003" pitchFamily="2" charset="-79"/>
+                  </a:rPr>
+                  <a:t>leukemia</a:t>
+                </a:r>
+                <a:r>
+                  <a:rPr lang="en-GB" dirty="0">
+                    <a:solidFill>
+                      <a:schemeClr val="tx1">
+                        <a:lumMod val="95000"/>
+                        <a:lumOff val="5000"/>
+                      </a:schemeClr>
+                    </a:solidFill>
+                    <a:latin typeface="Didot" panose="02000503000000020003" pitchFamily="2" charset="-79"/>
+                    <a:cs typeface="Didot" panose="02000503000000020003" pitchFamily="2" charset="-79"/>
+                  </a:rPr>
+                  <a:t> with FLT3 mutation</a:t>
+                </a:r>
+              </a:p>
+              <a:p>
+                <a:pPr marL="285750" indent="-285750">
+                  <a:buFont typeface="Arial" panose="020B0604020202020204" pitchFamily="34" charset="0"/>
+                  <a:buChar char="•"/>
+                </a:pPr>
+                <a:endParaRPr lang="en-GB" b="0" i="0" dirty="0">
+                  <a:solidFill>
+                    <a:schemeClr val="tx1">
+                      <a:lumMod val="95000"/>
+                      <a:lumOff val="5000"/>
+                    </a:schemeClr>
+                  </a:solidFill>
+                  <a:effectLst/>
+                  <a:latin typeface="Didot" panose="02000503000000020003" pitchFamily="2" charset="-79"/>
+                  <a:cs typeface="Didot" panose="02000503000000020003" pitchFamily="2" charset="-79"/>
+                </a:endParaRPr>
+              </a:p>
+              <a:p>
+                <a:pPr marL="285750" indent="-285750">
+                  <a:buFont typeface="Arial" panose="020B0604020202020204" pitchFamily="34" charset="0"/>
+                  <a:buChar char="•"/>
+                </a:pPr>
+                <a:r>
+                  <a:rPr lang="en-GB" dirty="0">
+                    <a:solidFill>
+                      <a:schemeClr val="tx1">
+                        <a:lumMod val="95000"/>
+                        <a:lumOff val="5000"/>
+                      </a:schemeClr>
+                    </a:solidFill>
+                    <a:latin typeface="Didot" panose="02000503000000020003" pitchFamily="2" charset="-79"/>
+                    <a:cs typeface="Didot" panose="02000503000000020003" pitchFamily="2" charset="-79"/>
+                  </a:rPr>
+                  <a:t>To test the effect of</a:t>
+                </a:r>
+                <a:br>
+                  <a:rPr lang="en-GB" dirty="0">
+                    <a:solidFill>
+                      <a:schemeClr val="tx1">
+                        <a:lumMod val="95000"/>
+                        <a:lumOff val="5000"/>
+                      </a:schemeClr>
+                    </a:solidFill>
+                    <a:latin typeface="Didot" panose="02000503000000020003" pitchFamily="2" charset="-79"/>
+                    <a:cs typeface="Didot" panose="02000503000000020003" pitchFamily="2" charset="-79"/>
+                  </a:rPr>
+                </a:br>
+                <a:r>
+                  <a:rPr lang="en-GB" dirty="0" err="1">
+                    <a:solidFill>
+                      <a:schemeClr val="tx1">
+                        <a:lumMod val="95000"/>
+                        <a:lumOff val="5000"/>
+                      </a:schemeClr>
+                    </a:solidFill>
+                    <a:latin typeface="Didot" panose="02000503000000020003" pitchFamily="2" charset="-79"/>
+                    <a:cs typeface="Didot" panose="02000503000000020003" pitchFamily="2" charset="-79"/>
+                  </a:rPr>
+                  <a:t>Midostaurin</a:t>
+                </a:r>
+                <a:endParaRPr lang="en-GB" b="0" i="0" dirty="0">
+                  <a:solidFill>
+                    <a:schemeClr val="tx1">
+                      <a:lumMod val="95000"/>
+                      <a:lumOff val="5000"/>
+                    </a:schemeClr>
+                  </a:solidFill>
+                  <a:effectLst/>
+                  <a:latin typeface="Didot" panose="02000503000000020003" pitchFamily="2" charset="-79"/>
+                  <a:cs typeface="Didot" panose="02000503000000020003" pitchFamily="2" charset="-79"/>
+                </a:endParaRPr>
+              </a:p>
+              <a:p>
+                <a:endParaRPr lang="en-US" dirty="0">
+                  <a:solidFill>
+                    <a:schemeClr val="tx1">
+                      <a:lumMod val="95000"/>
+                      <a:lumOff val="5000"/>
+                    </a:schemeClr>
+                  </a:solidFill>
+                  <a:latin typeface="Didot" panose="02000503000000020003" pitchFamily="2" charset="-79"/>
+                  <a:cs typeface="Didot" panose="02000503000000020003" pitchFamily="2" charset="-79"/>
+                </a:endParaRPr>
+              </a:p>
+            </p:txBody>
+          </p:sp>
+        </mc:Choice>
+        <mc:Fallback>
+          <p:sp>
+            <p:nvSpPr>
+              <p:cNvPr id="3" name="TextBox 2">
+                <a:extLst>
+                  <a:ext uri="{FF2B5EF4-FFF2-40B4-BE49-F238E27FC236}">
+                    <a16:creationId xmlns:a16="http://schemas.microsoft.com/office/drawing/2014/main" id="{065FE533-6C3D-DA1A-A0F7-164BB45DE410}"/>
+                  </a:ext>
+                </a:extLst>
+              </p:cNvPr>
+              <p:cNvSpPr txBox="1">
+                <a:spLocks noRot="1" noChangeAspect="1" noMove="1" noResize="1" noEditPoints="1" noAdjustHandles="1" noChangeArrowheads="1" noChangeShapeType="1" noTextEdit="1"/>
+              </p:cNvSpPr>
+              <p:nvPr/>
+            </p:nvSpPr>
+            <p:spPr>
+              <a:xfrm>
+                <a:off x="7757856" y="2381685"/>
+                <a:ext cx="3018143" cy="3693319"/>
+              </a:xfrm>
+              <a:prstGeom prst="rect">
+                <a:avLst/>
+              </a:prstGeom>
+              <a:blipFill>
+                <a:blip r:embed="rId4"/>
+                <a:stretch>
+                  <a:fillRect l="-1681" t="-685"/>
+                </a:stretch>
+              </a:blipFill>
+            </p:spPr>
+            <p:txBody>
+              <a:bodyPr/>
+              <a:lstStyle/>
+              <a:p>
+                <a:r>
+                  <a:rPr lang="en-US">
+                    <a:noFill/>
+                  </a:rPr>
+                  <a:t> </a:t>
+                </a:r>
+              </a:p>
+            </p:txBody>
+          </p:sp>
+        </mc:Fallback>
+      </mc:AlternateContent>
     </p:spTree>
     <p:extLst>
       <p:ext uri="{BB962C8B-B14F-4D97-AF65-F5344CB8AC3E}">
-        <p14:creationId xmlns:p14="http://schemas.microsoft.com/office/powerpoint/2010/main" val="4091178126"/>
+        <p14:creationId xmlns:p14="http://schemas.microsoft.com/office/powerpoint/2010/main" val="768789475"/>
       </p:ext>
     </p:extLst>
   </p:cSld>
@@ -4913,7 +6266,7 @@
           <p:cNvPr id="2" name="Title 1">
             <a:extLst>
               <a:ext uri="{FF2B5EF4-FFF2-40B4-BE49-F238E27FC236}">
-                <a16:creationId xmlns:a16="http://schemas.microsoft.com/office/drawing/2014/main" id="{17FCE676-B97A-4026-9CC3-92147AE350AA}"/>
+                <a16:creationId xmlns:a16="http://schemas.microsoft.com/office/drawing/2014/main" id="{B10EA626-E9BD-1680-8E7C-E9615F8F0635}"/>
               </a:ext>
             </a:extLst>
           </p:cNvPr>
@@ -4931,25 +6284,340 @@
           <a:p>
             <a:r>
               <a:rPr lang="en-US" dirty="0"/>
-              <a:t>Implementation</a:t>
-            </a:r>
-          </a:p>
-        </p:txBody>
-      </p:sp>
-      <p:sp>
-        <p:nvSpPr>
-          <p:cNvPr id="3" name="Content Placeholder 2">
-            <a:extLst>
-              <a:ext uri="{FF2B5EF4-FFF2-40B4-BE49-F238E27FC236}">
-                <a16:creationId xmlns:a16="http://schemas.microsoft.com/office/drawing/2014/main" id="{3EB3F950-1632-18CF-C3B8-1AEB5BC53B0D}"/>
-              </a:ext>
-            </a:extLst>
-          </p:cNvPr>
-          <p:cNvSpPr>
-            <a:spLocks noGrp="1"/>
-          </p:cNvSpPr>
-          <p:nvPr>
-            <p:ph sz="half" idx="10"/>
+              <a:t>Sample size estimation</a:t>
+            </a:r>
+          </a:p>
+        </p:txBody>
+      </p:sp>
+      <mc:AlternateContent xmlns:mc="http://schemas.openxmlformats.org/markup-compatibility/2006">
+        <mc:Choice xmlns:a14="http://schemas.microsoft.com/office/drawing/2010/main" Requires="a14">
+          <p:sp>
+            <p:nvSpPr>
+              <p:cNvPr id="3" name="Content Placeholder 2">
+                <a:extLst>
+                  <a:ext uri="{FF2B5EF4-FFF2-40B4-BE49-F238E27FC236}">
+                    <a16:creationId xmlns:a16="http://schemas.microsoft.com/office/drawing/2014/main" id="{70D9B42C-2E94-96C4-72F0-7D24F688C5A6}"/>
+                  </a:ext>
+                </a:extLst>
+              </p:cNvPr>
+              <p:cNvSpPr>
+                <a:spLocks noGrp="1"/>
+              </p:cNvSpPr>
+              <p:nvPr>
+                <p:ph sz="half" idx="10"/>
+              </p:nvPr>
+            </p:nvSpPr>
+            <p:spPr>
+              <a:xfrm>
+                <a:off x="2496000" y="1655409"/>
+                <a:ext cx="7200000" cy="5023181"/>
+              </a:xfrm>
+            </p:spPr>
+            <p:txBody>
+              <a:bodyPr anchor="ctr">
+                <a:normAutofit/>
+              </a:bodyPr>
+              <a:lstStyle/>
+              <a:p>
+                <a:pPr marL="542925" indent="-447675">
+                  <a:buClr>
+                    <a:srgbClr val="00E47C"/>
+                  </a:buClr>
+                  <a:buFont typeface="Courier New" panose="02070309020205020404" pitchFamily="49" charset="0"/>
+                  <a:buChar char="o"/>
+                </a:pPr>
+                <a:r>
+                  <a:rPr lang="en-US" sz="2400" dirty="0"/>
+                  <a:t>Estimated:</a:t>
+                </a:r>
+              </a:p>
+              <a:p>
+                <a:pPr marL="1000125" lvl="1" indent="-447675">
+                  <a:buClr>
+                    <a:srgbClr val="00E47C"/>
+                  </a:buClr>
+                  <a:buFont typeface="Courier New" panose="02070309020205020404" pitchFamily="49" charset="0"/>
+                  <a:buChar char="o"/>
+                </a:pPr>
+                <a:r>
+                  <a:rPr lang="en-US" dirty="0"/>
+                  <a:t>restricted mean survival time (RMST)</a:t>
+                </a:r>
+                <a:br>
+                  <a:rPr lang="en-US" dirty="0"/>
+                </a:br>
+                <a:r>
+                  <a:rPr lang="en-US" dirty="0"/>
+                  <a:t>arm</a:t>
+                </a:r>
+                <a14:m>
+                  <m:oMath xmlns:m="http://schemas.openxmlformats.org/officeDocument/2006/math">
+                    <m:r>
+                      <a:rPr lang="en-US" b="0" i="0" smtClean="0">
+                        <a:latin typeface="Cambria Math" panose="02040503050406030204" pitchFamily="18" charset="0"/>
+                      </a:rPr>
+                      <m:t>1</m:t>
+                    </m:r>
+                    <m:r>
+                      <a:rPr lang="en-US" b="0" i="1" smtClean="0">
+                        <a:latin typeface="Cambria Math" panose="02040503050406030204" pitchFamily="18" charset="0"/>
+                      </a:rPr>
+                      <m:t>: 1241 </m:t>
+                    </m:r>
+                    <m:r>
+                      <a:rPr lang="en-US" b="0" i="1" smtClean="0">
+                        <a:latin typeface="Cambria Math" panose="02040503050406030204" pitchFamily="18" charset="0"/>
+                      </a:rPr>
+                      <m:t>𝑑𝑎𝑦𝑠</m:t>
+                    </m:r>
+                  </m:oMath>
+                </a14:m>
+                <a:r>
+                  <a:rPr lang="en-US" dirty="0"/>
+                  <a:t> arm</a:t>
+                </a:r>
+                <a14:m>
+                  <m:oMath xmlns:m="http://schemas.openxmlformats.org/officeDocument/2006/math">
+                    <m:r>
+                      <a:rPr lang="en-US" b="0" i="0" smtClean="0">
+                        <a:latin typeface="Cambria Math" panose="02040503050406030204" pitchFamily="18" charset="0"/>
+                      </a:rPr>
+                      <m:t>2: </m:t>
+                    </m:r>
+                    <m:r>
+                      <a:rPr lang="en-US" b="0" i="1" smtClean="0">
+                        <a:latin typeface="Cambria Math" panose="02040503050406030204" pitchFamily="18" charset="0"/>
+                      </a:rPr>
+                      <m:t>1489 </m:t>
+                    </m:r>
+                    <m:r>
+                      <a:rPr lang="en-US" b="0" i="1" smtClean="0">
+                        <a:latin typeface="Cambria Math" panose="02040503050406030204" pitchFamily="18" charset="0"/>
+                      </a:rPr>
+                      <m:t>𝑑𝑎𝑦𝑠</m:t>
+                    </m:r>
+                  </m:oMath>
+                </a14:m>
+                <a:endParaRPr lang="en-US" dirty="0"/>
+              </a:p>
+              <a:p>
+                <a:pPr marL="1000125" lvl="1" indent="-447675" algn="just">
+                  <a:buClr>
+                    <a:srgbClr val="00E47C"/>
+                  </a:buClr>
+                  <a:buFont typeface="Courier New" panose="02070309020205020404" pitchFamily="49" charset="0"/>
+                  <a:buChar char="o"/>
+                </a:pPr>
+                <a:r>
+                  <a:rPr lang="en-US" dirty="0"/>
+                  <a:t>dropout rate: </a:t>
+                </a:r>
+                <a14:m>
+                  <m:oMath xmlns:m="http://schemas.openxmlformats.org/officeDocument/2006/math">
+                    <m:r>
+                      <a:rPr lang="en-US" i="1" dirty="0" smtClean="0">
+                        <a:latin typeface="Cambria Math" panose="02040503050406030204" pitchFamily="18" charset="0"/>
+                      </a:rPr>
+                      <m:t>0.0004</m:t>
+                    </m:r>
+                    <m:r>
+                      <a:rPr lang="en-US" b="0" i="1" dirty="0" smtClean="0">
+                        <a:latin typeface="Cambria Math" panose="02040503050406030204" pitchFamily="18" charset="0"/>
+                      </a:rPr>
+                      <m:t>4 </m:t>
+                    </m:r>
+                    <m:sSup>
+                      <m:sSupPr>
+                        <m:ctrlPr>
+                          <a:rPr lang="en-US" i="1" dirty="0" smtClean="0">
+                            <a:latin typeface="Cambria Math" panose="02040503050406030204" pitchFamily="18" charset="0"/>
+                          </a:rPr>
+                        </m:ctrlPr>
+                      </m:sSupPr>
+                      <m:e>
+                        <m:r>
+                          <a:rPr lang="en-US" b="0" i="1" dirty="0" smtClean="0">
+                            <a:latin typeface="Cambria Math" panose="02040503050406030204" pitchFamily="18" charset="0"/>
+                          </a:rPr>
+                          <m:t>𝑑𝑎𝑦</m:t>
+                        </m:r>
+                      </m:e>
+                      <m:sup>
+                        <m:r>
+                          <a:rPr lang="en-US" b="0" i="1" dirty="0" smtClean="0">
+                            <a:latin typeface="Cambria Math" panose="02040503050406030204" pitchFamily="18" charset="0"/>
+                          </a:rPr>
+                          <m:t>−1</m:t>
+                        </m:r>
+                      </m:sup>
+                    </m:sSup>
+                  </m:oMath>
+                </a14:m>
+                <a:endParaRPr lang="en-US" baseline="30000" dirty="0"/>
+              </a:p>
+              <a:p>
+                <a:pPr marL="1000125" lvl="1" indent="-447675">
+                  <a:buClr>
+                    <a:srgbClr val="00E47C"/>
+                  </a:buClr>
+                  <a:buFont typeface="Courier New" panose="02070309020205020404" pitchFamily="49" charset="0"/>
+                  <a:buChar char="o"/>
+                </a:pPr>
+                <a:r>
+                  <a:rPr lang="en-US" dirty="0"/>
+                  <a:t>hazard rate from RMST</a:t>
+                </a:r>
+              </a:p>
+              <a:p>
+                <a:pPr marL="95250" indent="0">
+                  <a:buClr>
+                    <a:srgbClr val="00E47C"/>
+                  </a:buClr>
+                  <a:buNone/>
+                </a:pPr>
+                <a:endParaRPr lang="en-US" sz="2400" dirty="0"/>
+              </a:p>
+              <a:p>
+                <a:pPr marL="95250" indent="0">
+                  <a:buClr>
+                    <a:srgbClr val="00E47C"/>
+                  </a:buClr>
+                  <a:buNone/>
+                </a:pPr>
+                <a:r>
+                  <a:rPr lang="en-US" sz="2400" dirty="0"/>
+                  <a:t>For given level of significance and power</a:t>
+                </a:r>
+              </a:p>
+              <a:p>
+                <a:pPr marL="542925" indent="-447675">
+                  <a:buClr>
+                    <a:srgbClr val="00E47C"/>
+                  </a:buClr>
+                  <a:buFont typeface="Courier New" panose="02070309020205020404" pitchFamily="49" charset="0"/>
+                  <a:buChar char="o"/>
+                </a:pPr>
+                <a:r>
+                  <a:rPr lang="en-US" sz="2400" dirty="0"/>
+                  <a:t>Estimated number of events</a:t>
+                </a:r>
+                <a:br>
+                  <a:rPr lang="en-US" sz="2400" dirty="0"/>
+                </a:br>
+                <a:r>
+                  <a:rPr lang="en-GB" sz="2400" dirty="0"/>
+                  <a:t>Schoenfeld </a:t>
+                </a:r>
+                <a14:m>
+                  <m:oMath xmlns:m="http://schemas.openxmlformats.org/officeDocument/2006/math">
+                    <m:r>
+                      <a:rPr lang="en-GB" sz="2400" i="1" dirty="0" smtClean="0">
+                        <a:latin typeface="Cambria Math" panose="02040503050406030204" pitchFamily="18" charset="0"/>
+                      </a:rPr>
+                      <m:t>(1981) </m:t>
+                    </m:r>
+                  </m:oMath>
+                </a14:m>
+                <a:r>
+                  <a:rPr lang="en-GB" sz="2400" dirty="0"/>
+                  <a:t>method</a:t>
+                </a:r>
+              </a:p>
+              <a:p>
+                <a:pPr marL="542925" indent="-447675">
+                  <a:buClr>
+                    <a:srgbClr val="00E47C"/>
+                  </a:buClr>
+                  <a:buFont typeface="Courier New" panose="02070309020205020404" pitchFamily="49" charset="0"/>
+                  <a:buChar char="o"/>
+                </a:pPr>
+                <a:r>
+                  <a:rPr lang="en-US" sz="2400" dirty="0"/>
+                  <a:t>Estimated Sample size</a:t>
+                </a:r>
+                <a:br>
+                  <a:rPr lang="en-US" sz="2400" dirty="0"/>
+                </a:br>
+                <a:r>
+                  <a:rPr lang="en-US" sz="2400" dirty="0"/>
+                  <a:t>Lachin and Foulkes </a:t>
+                </a:r>
+                <a14:m>
+                  <m:oMath xmlns:m="http://schemas.openxmlformats.org/officeDocument/2006/math">
+                    <m:r>
+                      <a:rPr lang="en-US" sz="2400" i="1" dirty="0" smtClean="0">
+                        <a:latin typeface="Cambria Math" panose="02040503050406030204" pitchFamily="18" charset="0"/>
+                      </a:rPr>
+                      <m:t>(1986)</m:t>
+                    </m:r>
+                  </m:oMath>
+                </a14:m>
+                <a:r>
+                  <a:rPr lang="en-US" sz="2400" dirty="0"/>
+                  <a:t> method</a:t>
+                </a:r>
+              </a:p>
+            </p:txBody>
+          </p:sp>
+        </mc:Choice>
+        <mc:Fallback>
+          <p:sp>
+            <p:nvSpPr>
+              <p:cNvPr id="3" name="Content Placeholder 2">
+                <a:extLst>
+                  <a:ext uri="{FF2B5EF4-FFF2-40B4-BE49-F238E27FC236}">
+                    <a16:creationId xmlns:a16="http://schemas.microsoft.com/office/drawing/2014/main" id="{70D9B42C-2E94-96C4-72F0-7D24F688C5A6}"/>
+                  </a:ext>
+                </a:extLst>
+              </p:cNvPr>
+              <p:cNvSpPr>
+                <a:spLocks noGrp="1" noRot="1" noChangeAspect="1" noMove="1" noResize="1" noEditPoints="1" noAdjustHandles="1" noChangeArrowheads="1" noChangeShapeType="1" noTextEdit="1"/>
+              </p:cNvSpPr>
+              <p:nvPr>
+                <p:ph sz="half" idx="10"/>
+              </p:nvPr>
+            </p:nvSpPr>
+            <p:spPr>
+              <a:xfrm>
+                <a:off x="2496000" y="1655409"/>
+                <a:ext cx="7200000" cy="5023181"/>
+              </a:xfrm>
+              <a:blipFill>
+                <a:blip r:embed="rId2"/>
+                <a:stretch>
+                  <a:fillRect/>
+                </a:stretch>
+              </a:blipFill>
+            </p:spPr>
+            <p:txBody>
+              <a:bodyPr/>
+              <a:lstStyle/>
+              <a:p>
+                <a:r>
+                  <a:rPr lang="en-US">
+                    <a:noFill/>
+                  </a:rPr>
+                  <a:t> </a:t>
+                </a:r>
+              </a:p>
+            </p:txBody>
+          </p:sp>
+        </mc:Fallback>
+      </mc:AlternateContent>
+      <p:sp>
+        <p:nvSpPr>
+          <p:cNvPr id="4" name="Date Placeholder 3">
+            <a:extLst>
+              <a:ext uri="{FF2B5EF4-FFF2-40B4-BE49-F238E27FC236}">
+                <a16:creationId xmlns:a16="http://schemas.microsoft.com/office/drawing/2014/main" id="{D784B2C1-F138-D8BA-BE74-D32358759B04}"/>
+              </a:ext>
+            </a:extLst>
+          </p:cNvPr>
+          <p:cNvSpPr>
+            <a:spLocks noGrp="1"/>
+          </p:cNvSpPr>
+          <p:nvPr>
+            <p:ph type="dt" sz="half" idx="2"/>
           </p:nvPr>
         </p:nvSpPr>
         <p:spPr/>
@@ -4958,55 +6626,27 @@
           <a:lstStyle/>
           <a:p>
             <a:r>
-              <a:rPr lang="en-US" dirty="0"/>
-              <a:t>Used R</a:t>
-            </a:r>
-          </a:p>
-          <a:p>
-            <a:r>
-              <a:rPr lang="en-US" dirty="0"/>
-              <a:t>Estimated hazard from the data</a:t>
-            </a:r>
-          </a:p>
-          <a:p>
-            <a:r>
-              <a:rPr lang="en-US" dirty="0"/>
-              <a:t>Used two different models</a:t>
-            </a:r>
-          </a:p>
-          <a:p>
+              <a:rPr lang="de-DE" dirty="0"/>
+              <a:t>3 JUN 24</a:t>
+            </a:r>
             <a:endParaRPr lang="en-US" dirty="0"/>
           </a:p>
-          <a:p>
-            <a:r>
-              <a:rPr lang="en-US" dirty="0"/>
-              <a:t>Code available on </a:t>
-            </a:r>
-            <a:r>
-              <a:rPr lang="en-US" dirty="0" err="1"/>
-              <a:t>github</a:t>
-            </a:r>
-            <a:endParaRPr lang="en-US" dirty="0"/>
-          </a:p>
-          <a:p>
-            <a:endParaRPr lang="en-US" dirty="0"/>
-          </a:p>
-        </p:txBody>
-      </p:sp>
-      <p:sp>
-        <p:nvSpPr>
-          <p:cNvPr id="4" name="Date Placeholder 3">
-            <a:extLst>
-              <a:ext uri="{FF2B5EF4-FFF2-40B4-BE49-F238E27FC236}">
-                <a16:creationId xmlns:a16="http://schemas.microsoft.com/office/drawing/2014/main" id="{BD21AC86-E277-F55E-0BD6-9FDAA64B18F5}"/>
-              </a:ext>
-            </a:extLst>
-          </p:cNvPr>
-          <p:cNvSpPr>
-            <a:spLocks noGrp="1"/>
-          </p:cNvSpPr>
-          <p:nvPr>
-            <p:ph type="dt" sz="half" idx="2"/>
+        </p:txBody>
+      </p:sp>
+      <p:sp>
+        <p:nvSpPr>
+          <p:cNvPr id="5" name="Footer Placeholder 4">
+            <a:extLst>
+              <a:ext uri="{FF2B5EF4-FFF2-40B4-BE49-F238E27FC236}">
+                <a16:creationId xmlns:a16="http://schemas.microsoft.com/office/drawing/2014/main" id="{E7984B71-B331-82B2-AB08-C0B743CE586D}"/>
+              </a:ext>
+            </a:extLst>
+          </p:cNvPr>
+          <p:cNvSpPr>
+            <a:spLocks noGrp="1"/>
+          </p:cNvSpPr>
+          <p:nvPr>
+            <p:ph type="ftr" sz="quarter" idx="3"/>
           </p:nvPr>
         </p:nvSpPr>
         <p:spPr/>
@@ -5015,35 +6655,6 @@
           <a:lstStyle/>
           <a:p>
             <a:r>
-              <a:rPr lang="de-DE"/>
-              <a:t>3 JUN 24</a:t>
-            </a:r>
-            <a:endParaRPr lang="en-US" dirty="0"/>
-          </a:p>
-        </p:txBody>
-      </p:sp>
-      <p:sp>
-        <p:nvSpPr>
-          <p:cNvPr id="5" name="Footer Placeholder 4">
-            <a:extLst>
-              <a:ext uri="{FF2B5EF4-FFF2-40B4-BE49-F238E27FC236}">
-                <a16:creationId xmlns:a16="http://schemas.microsoft.com/office/drawing/2014/main" id="{AA0C739C-809C-F24B-7238-8062366C5308}"/>
-              </a:ext>
-            </a:extLst>
-          </p:cNvPr>
-          <p:cNvSpPr>
-            <a:spLocks noGrp="1"/>
-          </p:cNvSpPr>
-          <p:nvPr>
-            <p:ph type="ftr" sz="quarter" idx="3"/>
-          </p:nvPr>
-        </p:nvSpPr>
-        <p:spPr/>
-        <p:txBody>
-          <a:bodyPr/>
-          <a:lstStyle/>
-          <a:p>
-            <a:r>
               <a:rPr lang="en-US"/>
               <a:t>SIMULATION 10499</a:t>
             </a:r>
@@ -5056,7 +6667,7 @@
           <p:cNvPr id="6" name="Slide Number Placeholder 5">
             <a:extLst>
               <a:ext uri="{FF2B5EF4-FFF2-40B4-BE49-F238E27FC236}">
-                <a16:creationId xmlns:a16="http://schemas.microsoft.com/office/drawing/2014/main" id="{B3904964-B4F4-ED44-2388-52E3B1B70601}"/>
+                <a16:creationId xmlns:a16="http://schemas.microsoft.com/office/drawing/2014/main" id="{D258F551-CE34-0D26-764C-455130DCC74A}"/>
               </a:ext>
             </a:extLst>
           </p:cNvPr>
@@ -5084,7 +6695,7 @@
     </p:spTree>
     <p:extLst>
       <p:ext uri="{BB962C8B-B14F-4D97-AF65-F5344CB8AC3E}">
-        <p14:creationId xmlns:p14="http://schemas.microsoft.com/office/powerpoint/2010/main" val="2461502498"/>
+        <p14:creationId xmlns:p14="http://schemas.microsoft.com/office/powerpoint/2010/main" val="999737934"/>
       </p:ext>
     </p:extLst>
   </p:cSld>
@@ -5116,7 +6727,7 @@
           <p:cNvPr id="2" name="Title 1">
             <a:extLst>
               <a:ext uri="{FF2B5EF4-FFF2-40B4-BE49-F238E27FC236}">
-                <a16:creationId xmlns:a16="http://schemas.microsoft.com/office/drawing/2014/main" id="{5CAF4DF5-C90E-2B0A-0CAA-8C0B3E55E19B}"/>
+                <a16:creationId xmlns:a16="http://schemas.microsoft.com/office/drawing/2014/main" id="{17FCE676-B97A-4026-9CC3-92147AE350AA}"/>
               </a:ext>
             </a:extLst>
           </p:cNvPr>
@@ -5134,37 +6745,63 @@
           <a:p>
             <a:r>
               <a:rPr lang="en-US" dirty="0"/>
-              <a:t>Simulations</a:t>
-            </a:r>
-          </a:p>
-        </p:txBody>
-      </p:sp>
-      <p:sp>
-        <p:nvSpPr>
-          <p:cNvPr id="4" name="Date Placeholder 3">
-            <a:extLst>
-              <a:ext uri="{FF2B5EF4-FFF2-40B4-BE49-F238E27FC236}">
-                <a16:creationId xmlns:a16="http://schemas.microsoft.com/office/drawing/2014/main" id="{BD18978C-FEA2-C1D5-0FA5-0A74ED639669}"/>
-              </a:ext>
-            </a:extLst>
-          </p:cNvPr>
-          <p:cNvSpPr>
-            <a:spLocks noGrp="1"/>
-          </p:cNvSpPr>
-          <p:nvPr>
-            <p:ph type="dt" sz="half" idx="2"/>
-          </p:nvPr>
-        </p:nvSpPr>
-        <p:spPr>
-          <a:xfrm rot="5400000">
-            <a:off x="-2250791" y="3107399"/>
-            <a:ext cx="5856571" cy="540000"/>
-          </a:xfrm>
-        </p:spPr>
+              <a:t>Two hazard models</a:t>
+            </a:r>
+          </a:p>
+        </p:txBody>
+      </p:sp>
+      <p:sp>
+        <p:nvSpPr>
+          <p:cNvPr id="3" name="Content Placeholder 2">
+            <a:extLst>
+              <a:ext uri="{FF2B5EF4-FFF2-40B4-BE49-F238E27FC236}">
+                <a16:creationId xmlns:a16="http://schemas.microsoft.com/office/drawing/2014/main" id="{3EB3F950-1632-18CF-C3B8-1AEB5BC53B0D}"/>
+              </a:ext>
+            </a:extLst>
+          </p:cNvPr>
+          <p:cNvSpPr>
+            <a:spLocks noGrp="1"/>
+          </p:cNvSpPr>
+          <p:nvPr>
+            <p:ph sz="half" idx="10"/>
+          </p:nvPr>
+        </p:nvSpPr>
+        <p:spPr/>
         <p:txBody>
           <a:bodyPr/>
           <a:lstStyle/>
           <a:p>
+            <a:pPr marL="0" indent="0" algn="ctr">
+              <a:buNone/>
+            </a:pPr>
+            <a:r>
+              <a:rPr lang="en-US" sz="2000" dirty="0"/>
+              <a:t>Weibull distribution vs Flexible model</a:t>
+            </a:r>
+          </a:p>
+        </p:txBody>
+      </p:sp>
+      <p:sp>
+        <p:nvSpPr>
+          <p:cNvPr id="4" name="Date Placeholder 3">
+            <a:extLst>
+              <a:ext uri="{FF2B5EF4-FFF2-40B4-BE49-F238E27FC236}">
+                <a16:creationId xmlns:a16="http://schemas.microsoft.com/office/drawing/2014/main" id="{BD21AC86-E277-F55E-0BD6-9FDAA64B18F5}"/>
+              </a:ext>
+            </a:extLst>
+          </p:cNvPr>
+          <p:cNvSpPr>
+            <a:spLocks noGrp="1"/>
+          </p:cNvSpPr>
+          <p:nvPr>
+            <p:ph type="dt" sz="half" idx="2"/>
+          </p:nvPr>
+        </p:nvSpPr>
+        <p:spPr/>
+        <p:txBody>
+          <a:bodyPr/>
+          <a:lstStyle/>
+          <a:p>
             <a:r>
               <a:rPr lang="de-DE"/>
               <a:t>3 JUN 24</a:t>
@@ -5178,7 +6815,7 @@
           <p:cNvPr id="5" name="Footer Placeholder 4">
             <a:extLst>
               <a:ext uri="{FF2B5EF4-FFF2-40B4-BE49-F238E27FC236}">
-                <a16:creationId xmlns:a16="http://schemas.microsoft.com/office/drawing/2014/main" id="{50FECC4C-D60F-8AA2-EDD6-1205EC73E5B5}"/>
+                <a16:creationId xmlns:a16="http://schemas.microsoft.com/office/drawing/2014/main" id="{AA0C739C-809C-F24B-7238-8062366C5308}"/>
               </a:ext>
             </a:extLst>
           </p:cNvPr>
@@ -5189,12 +6826,7 @@
             <p:ph type="ftr" sz="quarter" idx="3"/>
           </p:nvPr>
         </p:nvSpPr>
-        <p:spPr>
-          <a:xfrm rot="16200000">
-            <a:off x="9552505" y="4073685"/>
-            <a:ext cx="3924000" cy="540000"/>
-          </a:xfrm>
-        </p:spPr>
+        <p:spPr/>
         <p:txBody>
           <a:bodyPr/>
           <a:lstStyle/>
@@ -5212,7 +6844,7 @@
           <p:cNvPr id="6" name="Slide Number Placeholder 5">
             <a:extLst>
               <a:ext uri="{FF2B5EF4-FFF2-40B4-BE49-F238E27FC236}">
-                <a16:creationId xmlns:a16="http://schemas.microsoft.com/office/drawing/2014/main" id="{D707A01A-3BF7-F38E-9CE0-B758E9ED42FC}"/>
+                <a16:creationId xmlns:a16="http://schemas.microsoft.com/office/drawing/2014/main" id="{B3904964-B4F4-ED44-2388-52E3B1B70601}"/>
               </a:ext>
             </a:extLst>
           </p:cNvPr>
@@ -5223,18 +6855,14 @@
             <p:ph type="sldNum" sz="quarter" idx="4"/>
           </p:nvPr>
         </p:nvSpPr>
-        <p:spPr>
-          <a:xfrm>
-            <a:off x="11154506" y="572191"/>
-            <a:ext cx="629999" cy="540000"/>
-          </a:xfrm>
-        </p:spPr>
+        <p:spPr/>
         <p:txBody>
           <a:bodyPr/>
           <a:lstStyle/>
           <a:p>
             <a:fld id="{48F63A3B-78C7-47BE-AE5E-E10140E04643}" type="slidenum">
               <a:rPr lang="en-US" smtClean="0"/>
+              <a:pPr/>
               <a:t>6</a:t>
             </a:fld>
             <a:endParaRPr lang="en-US" dirty="0"/>
@@ -5243,19 +6871,17 @@
       </p:sp>
       <p:pic>
         <p:nvPicPr>
-          <p:cNvPr id="15" name="Content Placeholder 14">
-            <a:extLst>
-              <a:ext uri="{FF2B5EF4-FFF2-40B4-BE49-F238E27FC236}">
-                <a16:creationId xmlns:a16="http://schemas.microsoft.com/office/drawing/2014/main" id="{069259A0-F283-E562-9B9B-38746DA7E395}"/>
+          <p:cNvPr id="8" name="Graphic 7">
+            <a:extLst>
+              <a:ext uri="{FF2B5EF4-FFF2-40B4-BE49-F238E27FC236}">
+                <a16:creationId xmlns:a16="http://schemas.microsoft.com/office/drawing/2014/main" id="{D6E384F1-F1D5-8AB9-9B21-661EFBC68B5B}"/>
               </a:ext>
             </a:extLst>
           </p:cNvPr>
           <p:cNvPicPr>
-            <a:picLocks noGrp="1" noChangeAspect="1"/>
+            <a:picLocks noChangeAspect="1"/>
           </p:cNvPicPr>
-          <p:nvPr>
-            <p:ph sz="half" idx="10"/>
-          </p:nvPr>
+          <p:nvPr/>
         </p:nvPicPr>
         <p:blipFill>
           <a:blip r:embed="rId2">
@@ -5265,20 +6891,24 @@
               </a:ext>
             </a:extLst>
           </a:blip>
-          <a:srcRect/>
-          <a:stretch/>
+          <a:stretch>
+            <a:fillRect/>
+          </a:stretch>
         </p:blipFill>
         <p:spPr>
           <a:xfrm>
-            <a:off x="3042366" y="1504973"/>
-            <a:ext cx="6107267" cy="5022850"/>
+            <a:off x="3395999" y="1946415"/>
+            <a:ext cx="5400000" cy="4441168"/>
           </a:xfrm>
+          <a:prstGeom prst="rect">
+            <a:avLst/>
+          </a:prstGeom>
         </p:spPr>
       </p:pic>
     </p:spTree>
     <p:extLst>
       <p:ext uri="{BB962C8B-B14F-4D97-AF65-F5344CB8AC3E}">
-        <p14:creationId xmlns:p14="http://schemas.microsoft.com/office/powerpoint/2010/main" val="646070328"/>
+        <p14:creationId xmlns:p14="http://schemas.microsoft.com/office/powerpoint/2010/main" val="4091178126"/>
       </p:ext>
     </p:extLst>
   </p:cSld>
@@ -5310,7 +6940,7 @@
           <p:cNvPr id="2" name="Title 1">
             <a:extLst>
               <a:ext uri="{FF2B5EF4-FFF2-40B4-BE49-F238E27FC236}">
-                <a16:creationId xmlns:a16="http://schemas.microsoft.com/office/drawing/2014/main" id="{17FCE676-B97A-4026-9CC3-92147AE350AA}"/>
+                <a16:creationId xmlns:a16="http://schemas.microsoft.com/office/drawing/2014/main" id="{5CAF4DF5-C90E-2B0A-0CAA-8C0B3E55E19B}"/>
               </a:ext>
             </a:extLst>
           </p:cNvPr>
@@ -5328,124 +6958,17 @@
           <a:p>
             <a:r>
               <a:rPr lang="en-US" dirty="0"/>
-              <a:t>Comparison</a:t>
-            </a:r>
-          </a:p>
-        </p:txBody>
-      </p:sp>
-      <mc:AlternateContent xmlns:mc="http://schemas.openxmlformats.org/markup-compatibility/2006">
-        <mc:Choice xmlns:a14="http://schemas.microsoft.com/office/drawing/2010/main" Requires="a14">
-          <p:sp>
-            <p:nvSpPr>
-              <p:cNvPr id="3" name="Content Placeholder 2">
-                <a:extLst>
-                  <a:ext uri="{FF2B5EF4-FFF2-40B4-BE49-F238E27FC236}">
-                    <a16:creationId xmlns:a16="http://schemas.microsoft.com/office/drawing/2014/main" id="{3EB3F950-1632-18CF-C3B8-1AEB5BC53B0D}"/>
-                  </a:ext>
-                </a:extLst>
-              </p:cNvPr>
-              <p:cNvSpPr>
-                <a:spLocks noGrp="1"/>
-              </p:cNvSpPr>
-              <p:nvPr>
-                <p:ph sz="half" idx="10"/>
-              </p:nvPr>
-            </p:nvSpPr>
-            <p:spPr/>
-            <p:txBody>
-              <a:bodyPr/>
-              <a:lstStyle/>
-              <a:p>
-                <a14:m>
-                  <m:oMath xmlns:m="http://schemas.openxmlformats.org/officeDocument/2006/math">
-                    <m:r>
-                      <a:rPr lang="en-US" i="1" dirty="0" smtClean="0">
-                        <a:latin typeface="Cambria Math" panose="02040503050406030204" pitchFamily="18" charset="0"/>
-                      </a:rPr>
-                      <m:t>1</m:t>
-                    </m:r>
-                    <m:r>
-                      <a:rPr lang="en-US" i="1" dirty="0">
-                        <a:latin typeface="Cambria Math" panose="02040503050406030204" pitchFamily="18" charset="0"/>
-                      </a:rPr>
-                      <m:t>1</m:t>
-                    </m:r>
-                    <m:r>
-                      <a:rPr lang="en-US" i="1" dirty="0" smtClean="0">
-                        <a:latin typeface="Cambria Math" panose="02040503050406030204" pitchFamily="18" charset="0"/>
-                      </a:rPr>
-                      <m:t>% </m:t>
-                    </m:r>
-                  </m:oMath>
-                </a14:m>
-                <a:r>
-                  <a:rPr lang="en-US" dirty="0"/>
-                  <a:t>vs </a:t>
-                </a:r>
-                <a14:m>
-                  <m:oMath xmlns:m="http://schemas.openxmlformats.org/officeDocument/2006/math">
-                    <m:r>
-                      <a:rPr lang="en-US" i="1" dirty="0" smtClean="0">
-                        <a:latin typeface="Cambria Math" panose="02040503050406030204" pitchFamily="18" charset="0"/>
-                      </a:rPr>
-                      <m:t>5% </m:t>
-                    </m:r>
-                  </m:oMath>
-                </a14:m>
-                <a:r>
-                  <a:rPr lang="en-US" dirty="0"/>
-                  <a:t>bias</a:t>
-                </a:r>
-              </a:p>
-            </p:txBody>
-          </p:sp>
-        </mc:Choice>
-        <mc:Fallback>
-          <p:sp>
-            <p:nvSpPr>
-              <p:cNvPr id="3" name="Content Placeholder 2">
-                <a:extLst>
-                  <a:ext uri="{FF2B5EF4-FFF2-40B4-BE49-F238E27FC236}">
-                    <a16:creationId xmlns:a16="http://schemas.microsoft.com/office/drawing/2014/main" id="{3EB3F950-1632-18CF-C3B8-1AEB5BC53B0D}"/>
-                  </a:ext>
-                </a:extLst>
-              </p:cNvPr>
-              <p:cNvSpPr>
-                <a:spLocks noGrp="1" noRot="1" noChangeAspect="1" noMove="1" noResize="1" noEditPoints="1" noAdjustHandles="1" noChangeArrowheads="1" noChangeShapeType="1" noTextEdit="1"/>
-              </p:cNvSpPr>
-              <p:nvPr>
-                <p:ph sz="half" idx="10"/>
-              </p:nvPr>
-            </p:nvSpPr>
-            <p:spPr>
-              <a:blipFill>
-                <a:blip r:embed="rId2"/>
-                <a:stretch>
-                  <a:fillRect l="-1220" t="-2015"/>
-                </a:stretch>
-              </a:blipFill>
-            </p:spPr>
-            <p:txBody>
-              <a:bodyPr/>
-              <a:lstStyle/>
-              <a:p>
-                <a:r>
-                  <a:rPr lang="en-US">
-                    <a:noFill/>
-                  </a:rPr>
-                  <a:t> </a:t>
-                </a:r>
-              </a:p>
-            </p:txBody>
-          </p:sp>
-        </mc:Fallback>
-      </mc:AlternateContent>
+              <a:t>Simulated overall survival </a:t>
+            </a:r>
+          </a:p>
+        </p:txBody>
+      </p:sp>
       <p:sp>
         <p:nvSpPr>
           <p:cNvPr id="4" name="Date Placeholder 3">
             <a:extLst>
               <a:ext uri="{FF2B5EF4-FFF2-40B4-BE49-F238E27FC236}">
-                <a16:creationId xmlns:a16="http://schemas.microsoft.com/office/drawing/2014/main" id="{BD21AC86-E277-F55E-0BD6-9FDAA64B18F5}"/>
+                <a16:creationId xmlns:a16="http://schemas.microsoft.com/office/drawing/2014/main" id="{BD18978C-FEA2-C1D5-0FA5-0A74ED639669}"/>
               </a:ext>
             </a:extLst>
           </p:cNvPr>
@@ -5456,7 +6979,12 @@
             <p:ph type="dt" sz="half" idx="2"/>
           </p:nvPr>
         </p:nvSpPr>
-        <p:spPr/>
+        <p:spPr>
+          <a:xfrm rot="5400000">
+            <a:off x="-2250791" y="3107399"/>
+            <a:ext cx="5856571" cy="540000"/>
+          </a:xfrm>
+        </p:spPr>
         <p:txBody>
           <a:bodyPr/>
           <a:lstStyle/>
@@ -5474,7 +7002,7 @@
           <p:cNvPr id="5" name="Footer Placeholder 4">
             <a:extLst>
               <a:ext uri="{FF2B5EF4-FFF2-40B4-BE49-F238E27FC236}">
-                <a16:creationId xmlns:a16="http://schemas.microsoft.com/office/drawing/2014/main" id="{AA0C739C-809C-F24B-7238-8062366C5308}"/>
+                <a16:creationId xmlns:a16="http://schemas.microsoft.com/office/drawing/2014/main" id="{50FECC4C-D60F-8AA2-EDD6-1205EC73E5B5}"/>
               </a:ext>
             </a:extLst>
           </p:cNvPr>
@@ -5485,7 +7013,12 @@
             <p:ph type="ftr" sz="quarter" idx="3"/>
           </p:nvPr>
         </p:nvSpPr>
-        <p:spPr/>
+        <p:spPr>
+          <a:xfrm rot="16200000">
+            <a:off x="9552505" y="4073685"/>
+            <a:ext cx="3924000" cy="540000"/>
+          </a:xfrm>
+        </p:spPr>
         <p:txBody>
           <a:bodyPr/>
           <a:lstStyle/>
@@ -5503,7 +7036,7 @@
           <p:cNvPr id="6" name="Slide Number Placeholder 5">
             <a:extLst>
               <a:ext uri="{FF2B5EF4-FFF2-40B4-BE49-F238E27FC236}">
-                <a16:creationId xmlns:a16="http://schemas.microsoft.com/office/drawing/2014/main" id="{B3904964-B4F4-ED44-2388-52E3B1B70601}"/>
+                <a16:creationId xmlns:a16="http://schemas.microsoft.com/office/drawing/2014/main" id="{D707A01A-3BF7-F38E-9CE0-B758E9ED42FC}"/>
               </a:ext>
             </a:extLst>
           </p:cNvPr>
@@ -5514,24 +7047,63 @@
             <p:ph type="sldNum" sz="quarter" idx="4"/>
           </p:nvPr>
         </p:nvSpPr>
-        <p:spPr/>
+        <p:spPr>
+          <a:xfrm>
+            <a:off x="11154506" y="572191"/>
+            <a:ext cx="629999" cy="540000"/>
+          </a:xfrm>
+        </p:spPr>
         <p:txBody>
           <a:bodyPr/>
           <a:lstStyle/>
           <a:p>
             <a:fld id="{48F63A3B-78C7-47BE-AE5E-E10140E04643}" type="slidenum">
               <a:rPr lang="en-US" smtClean="0"/>
-              <a:pPr/>
               <a:t>7</a:t>
             </a:fld>
             <a:endParaRPr lang="en-US" dirty="0"/>
           </a:p>
         </p:txBody>
       </p:sp>
+      <p:pic>
+        <p:nvPicPr>
+          <p:cNvPr id="9" name="Content Placeholder 8">
+            <a:extLst>
+              <a:ext uri="{FF2B5EF4-FFF2-40B4-BE49-F238E27FC236}">
+                <a16:creationId xmlns:a16="http://schemas.microsoft.com/office/drawing/2014/main" id="{F706AB13-557F-B73E-7595-9B6C72A22D61}"/>
+              </a:ext>
+            </a:extLst>
+          </p:cNvPr>
+          <p:cNvPicPr>
+            <a:picLocks noGrp="1" noChangeAspect="1"/>
+          </p:cNvPicPr>
+          <p:nvPr>
+            <p:ph sz="half" idx="10"/>
+          </p:nvPr>
+        </p:nvPicPr>
+        <p:blipFill>
+          <a:blip r:embed="rId2">
+            <a:extLst>
+              <a:ext uri="{96DAC541-7B7A-43D3-8B79-37D633B846F1}">
+                <asvg:svgBlip xmlns:asvg="http://schemas.microsoft.com/office/drawing/2016/SVG/main" r:embed="rId3"/>
+              </a:ext>
+            </a:extLst>
+          </a:blip>
+          <a:stretch>
+            <a:fillRect/>
+          </a:stretch>
+        </p:blipFill>
+        <p:spPr>
+          <a:xfrm>
+            <a:off x="1970770" y="1504973"/>
+            <a:ext cx="8250460" cy="5022850"/>
+          </a:xfrm>
+        </p:spPr>
+      </p:pic>
     </p:spTree>
     <p:extLst>
       <p:ext uri="{BB962C8B-B14F-4D97-AF65-F5344CB8AC3E}">
-        <p14:creationId xmlns:p14="http://schemas.microsoft.com/office/powerpoint/2010/main" val="2377741877"/>
+        <p14:creationId xmlns:p14="http://schemas.microsoft.com/office/powerpoint/2010/main" val="646070328"/>
       </p:ext>
     </p:extLst>
   </p:cSld>
@@ -5581,57 +7153,8 @@
           <a:p>
             <a:r>
               <a:rPr lang="en-US" dirty="0"/>
-              <a:t>Take away</a:t>
-            </a:r>
-          </a:p>
-        </p:txBody>
-      </p:sp>
-      <p:sp>
-        <p:nvSpPr>
-          <p:cNvPr id="3" name="Content Placeholder 2">
-            <a:extLst>
-              <a:ext uri="{FF2B5EF4-FFF2-40B4-BE49-F238E27FC236}">
-                <a16:creationId xmlns:a16="http://schemas.microsoft.com/office/drawing/2014/main" id="{3EB3F950-1632-18CF-C3B8-1AEB5BC53B0D}"/>
-              </a:ext>
-            </a:extLst>
-          </p:cNvPr>
-          <p:cNvSpPr>
-            <a:spLocks noGrp="1"/>
-          </p:cNvSpPr>
-          <p:nvPr>
-            <p:ph sz="half" idx="10"/>
-          </p:nvPr>
-        </p:nvSpPr>
-        <p:spPr/>
-        <p:txBody>
-          <a:bodyPr/>
-          <a:lstStyle/>
-          <a:p>
-            <a:r>
-              <a:rPr lang="en-US" dirty="0"/>
-              <a:t>Premise</a:t>
-            </a:r>
-          </a:p>
-          <a:p>
-            <a:r>
-              <a:rPr lang="en-US" dirty="0"/>
-              <a:t>Hazard models</a:t>
-            </a:r>
-          </a:p>
-          <a:p>
-            <a:r>
-              <a:rPr lang="en-US" dirty="0"/>
-              <a:t>Simulations</a:t>
-            </a:r>
-          </a:p>
-          <a:p>
-            <a:r>
-              <a:rPr lang="en-US" dirty="0"/>
               <a:t>Comparison</a:t>
             </a:r>
-          </a:p>
-          <a:p>
-            <a:endParaRPr lang="en-US" dirty="0"/>
           </a:p>
         </p:txBody>
       </p:sp>
@@ -5723,10 +7246,850 @@
           </a:p>
         </p:txBody>
       </p:sp>
+      <mc:AlternateContent xmlns:mc="http://schemas.openxmlformats.org/markup-compatibility/2006">
+        <mc:Choice xmlns:a14="http://schemas.microsoft.com/office/drawing/2010/main" Requires="a14">
+          <p:sp>
+            <p:nvSpPr>
+              <p:cNvPr id="12" name="Content Placeholder 2">
+                <a:extLst>
+                  <a:ext uri="{FF2B5EF4-FFF2-40B4-BE49-F238E27FC236}">
+                    <a16:creationId xmlns:a16="http://schemas.microsoft.com/office/drawing/2014/main" id="{5DCEB9ED-2241-F178-C119-1D5C8A43FC45}"/>
+                  </a:ext>
+                </a:extLst>
+              </p:cNvPr>
+              <p:cNvSpPr>
+                <a:spLocks noGrp="1"/>
+              </p:cNvSpPr>
+              <p:nvPr>
+                <p:ph sz="half" idx="10"/>
+              </p:nvPr>
+            </p:nvSpPr>
+            <p:spPr>
+              <a:xfrm>
+                <a:off x="2496000" y="1655409"/>
+                <a:ext cx="7200000" cy="5023181"/>
+              </a:xfrm>
+            </p:spPr>
+            <p:txBody>
+              <a:bodyPr anchor="ctr"/>
+              <a:lstStyle/>
+              <a:p>
+                <a:pPr marL="542925" indent="-447675">
+                  <a:buClr>
+                    <a:srgbClr val="00E47C"/>
+                  </a:buClr>
+                  <a:buFont typeface="Courier New" panose="02070309020205020404" pitchFamily="49" charset="0"/>
+                  <a:buChar char="o"/>
+                </a:pPr>
+                <a:r>
+                  <a:rPr lang="en-US" dirty="0"/>
+                  <a:t>Simulated </a:t>
+                </a:r>
+                <a14:m>
+                  <m:oMath xmlns:m="http://schemas.openxmlformats.org/officeDocument/2006/math">
+                    <m:r>
+                      <a:rPr lang="en-US" i="1" dirty="0" smtClean="0">
+                        <a:latin typeface="Cambria Math" panose="02040503050406030204" pitchFamily="18" charset="0"/>
+                      </a:rPr>
+                      <m:t>1000</m:t>
+                    </m:r>
+                  </m:oMath>
+                </a14:m>
+                <a:r>
+                  <a:rPr lang="en-US" dirty="0"/>
+                  <a:t> in-silico clinical trials</a:t>
+                </a:r>
+              </a:p>
+              <a:p>
+                <a:pPr marL="542925" indent="-447675">
+                  <a:buClr>
+                    <a:srgbClr val="00E47C"/>
+                  </a:buClr>
+                  <a:buFont typeface="Courier New" panose="02070309020205020404" pitchFamily="49" charset="0"/>
+                  <a:buChar char="o"/>
+                </a:pPr>
+                <a:endParaRPr lang="en-US" dirty="0"/>
+              </a:p>
+              <a:p>
+                <a:pPr marL="542925" indent="-447675">
+                  <a:buClr>
+                    <a:srgbClr val="00E47C"/>
+                  </a:buClr>
+                  <a:buFont typeface="Courier New" panose="02070309020205020404" pitchFamily="49" charset="0"/>
+                  <a:buChar char="o"/>
+                </a:pPr>
+                <a:r>
+                  <a:rPr lang="en-US" dirty="0"/>
+                  <a:t>Used log hazard ratio for evaluation</a:t>
+                </a:r>
+              </a:p>
+              <a:p>
+                <a:pPr marL="542925" indent="-447675">
+                  <a:buClr>
+                    <a:srgbClr val="00E47C"/>
+                  </a:buClr>
+                  <a:buFont typeface="Courier New" panose="02070309020205020404" pitchFamily="49" charset="0"/>
+                  <a:buChar char="o"/>
+                </a:pPr>
+                <a:endParaRPr lang="en-US" dirty="0"/>
+              </a:p>
+              <a:p>
+                <a:pPr marL="542925" indent="-447675">
+                  <a:buClr>
+                    <a:srgbClr val="00E47C"/>
+                  </a:buClr>
+                  <a:buFont typeface="Courier New" panose="02070309020205020404" pitchFamily="49" charset="0"/>
+                  <a:buChar char="o"/>
+                </a:pPr>
+                <a:r>
+                  <a:rPr lang="en-US" dirty="0"/>
+                  <a:t>Weibull model bias = </a:t>
+                </a:r>
+                <a14:m>
+                  <m:oMath xmlns:m="http://schemas.openxmlformats.org/officeDocument/2006/math">
+                    <m:r>
+                      <a:rPr lang="en-US" i="1" dirty="0" smtClean="0">
+                        <a:latin typeface="Cambria Math" panose="02040503050406030204" pitchFamily="18" charset="0"/>
+                      </a:rPr>
+                      <m:t>8%</m:t>
+                    </m:r>
+                  </m:oMath>
+                </a14:m>
+                <a:endParaRPr lang="en-US" dirty="0"/>
+              </a:p>
+              <a:p>
+                <a:pPr marL="542925" indent="-447675">
+                  <a:buClr>
+                    <a:srgbClr val="00E47C"/>
+                  </a:buClr>
+                  <a:buFont typeface="Courier New" panose="02070309020205020404" pitchFamily="49" charset="0"/>
+                  <a:buChar char="o"/>
+                </a:pPr>
+                <a:endParaRPr lang="en-US" dirty="0"/>
+              </a:p>
+              <a:p>
+                <a:pPr marL="542925" indent="-447675">
+                  <a:buClr>
+                    <a:srgbClr val="00E47C"/>
+                  </a:buClr>
+                  <a:buFont typeface="Courier New" panose="02070309020205020404" pitchFamily="49" charset="0"/>
+                  <a:buChar char="o"/>
+                </a:pPr>
+                <a:r>
+                  <a:rPr lang="en-US" dirty="0"/>
+                  <a:t>Flexible model bias &lt; </a:t>
+                </a:r>
+                <a14:m>
+                  <m:oMath xmlns:m="http://schemas.openxmlformats.org/officeDocument/2006/math">
+                    <m:r>
+                      <a:rPr lang="en-US" i="1" dirty="0" smtClean="0">
+                        <a:latin typeface="Cambria Math" panose="02040503050406030204" pitchFamily="18" charset="0"/>
+                      </a:rPr>
+                      <m:t>1%</m:t>
+                    </m:r>
+                  </m:oMath>
+                </a14:m>
+                <a:endParaRPr lang="en-US" dirty="0"/>
+              </a:p>
+            </p:txBody>
+          </p:sp>
+        </mc:Choice>
+        <mc:Fallback>
+          <p:sp>
+            <p:nvSpPr>
+              <p:cNvPr id="12" name="Content Placeholder 2">
+                <a:extLst>
+                  <a:ext uri="{FF2B5EF4-FFF2-40B4-BE49-F238E27FC236}">
+                    <a16:creationId xmlns:a16="http://schemas.microsoft.com/office/drawing/2014/main" id="{5DCEB9ED-2241-F178-C119-1D5C8A43FC45}"/>
+                  </a:ext>
+                </a:extLst>
+              </p:cNvPr>
+              <p:cNvSpPr>
+                <a:spLocks noGrp="1" noRot="1" noChangeAspect="1" noMove="1" noResize="1" noEditPoints="1" noAdjustHandles="1" noChangeArrowheads="1" noChangeShapeType="1" noTextEdit="1"/>
+              </p:cNvSpPr>
+              <p:nvPr>
+                <p:ph sz="half" idx="10"/>
+              </p:nvPr>
+            </p:nvSpPr>
+            <p:spPr>
+              <a:xfrm>
+                <a:off x="2496000" y="1655409"/>
+                <a:ext cx="7200000" cy="5023181"/>
+              </a:xfrm>
+              <a:blipFill>
+                <a:blip r:embed="rId2"/>
+                <a:stretch>
+                  <a:fillRect l="-352"/>
+                </a:stretch>
+              </a:blipFill>
+            </p:spPr>
+            <p:txBody>
+              <a:bodyPr/>
+              <a:lstStyle/>
+              <a:p>
+                <a:r>
+                  <a:rPr lang="en-US">
+                    <a:noFill/>
+                  </a:rPr>
+                  <a:t> </a:t>
+                </a:r>
+              </a:p>
+            </p:txBody>
+          </p:sp>
+        </mc:Fallback>
+      </mc:AlternateContent>
     </p:spTree>
     <p:extLst>
       <p:ext uri="{BB962C8B-B14F-4D97-AF65-F5344CB8AC3E}">
-        <p14:creationId xmlns:p14="http://schemas.microsoft.com/office/powerpoint/2010/main" val="3441598739"/>
+        <p14:creationId xmlns:p14="http://schemas.microsoft.com/office/powerpoint/2010/main" val="2377741877"/>
+      </p:ext>
+    </p:extLst>
+  </p:cSld>
+  <p:clrMapOvr>
+    <a:masterClrMapping/>
+  </p:clrMapOvr>
+</p:sld>
+</file>
+
+<file path=ppt/slides/slide9.xml><?xml version="1.0" encoding="utf-8"?>
+<p:sld xmlns:a="http://schemas.openxmlformats.org/drawingml/2006/main" xmlns:r="http://schemas.openxmlformats.org/officeDocument/2006/relationships" xmlns:p="http://schemas.openxmlformats.org/presentationml/2006/main">
+  <p:cSld>
+    <p:spTree>
+      <p:nvGrpSpPr>
+        <p:cNvPr id="1" name=""/>
+        <p:cNvGrpSpPr/>
+        <p:nvPr/>
+      </p:nvGrpSpPr>
+      <p:grpSpPr>
+        <a:xfrm>
+          <a:off x="0" y="0"/>
+          <a:ext cx="0" cy="0"/>
+          <a:chOff x="0" y="0"/>
+          <a:chExt cx="0" cy="0"/>
+        </a:xfrm>
+      </p:grpSpPr>
+      <p:sp>
+        <p:nvSpPr>
+          <p:cNvPr id="2" name="Title 1">
+            <a:extLst>
+              <a:ext uri="{FF2B5EF4-FFF2-40B4-BE49-F238E27FC236}">
+                <a16:creationId xmlns:a16="http://schemas.microsoft.com/office/drawing/2014/main" id="{17FCE676-B97A-4026-9CC3-92147AE350AA}"/>
+              </a:ext>
+            </a:extLst>
+          </p:cNvPr>
+          <p:cNvSpPr>
+            <a:spLocks noGrp="1"/>
+          </p:cNvSpPr>
+          <p:nvPr>
+            <p:ph type="title"/>
+          </p:nvPr>
+        </p:nvSpPr>
+        <p:spPr/>
+        <p:txBody>
+          <a:bodyPr/>
+          <a:lstStyle/>
+          <a:p>
+            <a:r>
+              <a:rPr lang="en-US" dirty="0"/>
+              <a:t>Possible extensions</a:t>
+            </a:r>
+          </a:p>
+        </p:txBody>
+      </p:sp>
+      <p:sp>
+        <p:nvSpPr>
+          <p:cNvPr id="4" name="Date Placeholder 3">
+            <a:extLst>
+              <a:ext uri="{FF2B5EF4-FFF2-40B4-BE49-F238E27FC236}">
+                <a16:creationId xmlns:a16="http://schemas.microsoft.com/office/drawing/2014/main" id="{BD21AC86-E277-F55E-0BD6-9FDAA64B18F5}"/>
+              </a:ext>
+            </a:extLst>
+          </p:cNvPr>
+          <p:cNvSpPr>
+            <a:spLocks noGrp="1"/>
+          </p:cNvSpPr>
+          <p:nvPr>
+            <p:ph type="dt" sz="half" idx="2"/>
+          </p:nvPr>
+        </p:nvSpPr>
+        <p:spPr/>
+        <p:txBody>
+          <a:bodyPr/>
+          <a:lstStyle/>
+          <a:p>
+            <a:r>
+              <a:rPr lang="de-DE" dirty="0"/>
+              <a:t>3 JUN 24</a:t>
+            </a:r>
+            <a:endParaRPr lang="en-US" dirty="0"/>
+          </a:p>
+        </p:txBody>
+      </p:sp>
+      <p:sp>
+        <p:nvSpPr>
+          <p:cNvPr id="5" name="Footer Placeholder 4">
+            <a:extLst>
+              <a:ext uri="{FF2B5EF4-FFF2-40B4-BE49-F238E27FC236}">
+                <a16:creationId xmlns:a16="http://schemas.microsoft.com/office/drawing/2014/main" id="{AA0C739C-809C-F24B-7238-8062366C5308}"/>
+              </a:ext>
+            </a:extLst>
+          </p:cNvPr>
+          <p:cNvSpPr>
+            <a:spLocks noGrp="1"/>
+          </p:cNvSpPr>
+          <p:nvPr>
+            <p:ph type="ftr" sz="quarter" idx="3"/>
+          </p:nvPr>
+        </p:nvSpPr>
+        <p:spPr/>
+        <p:txBody>
+          <a:bodyPr/>
+          <a:lstStyle/>
+          <a:p>
+            <a:r>
+              <a:rPr lang="en-US"/>
+              <a:t>SIMULATION 10499</a:t>
+            </a:r>
+            <a:endParaRPr lang="en-US" dirty="0"/>
+          </a:p>
+        </p:txBody>
+      </p:sp>
+      <p:sp>
+        <p:nvSpPr>
+          <p:cNvPr id="6" name="Slide Number Placeholder 5">
+            <a:extLst>
+              <a:ext uri="{FF2B5EF4-FFF2-40B4-BE49-F238E27FC236}">
+                <a16:creationId xmlns:a16="http://schemas.microsoft.com/office/drawing/2014/main" id="{B3904964-B4F4-ED44-2388-52E3B1B70601}"/>
+              </a:ext>
+            </a:extLst>
+          </p:cNvPr>
+          <p:cNvSpPr>
+            <a:spLocks noGrp="1"/>
+          </p:cNvSpPr>
+          <p:nvPr>
+            <p:ph type="sldNum" sz="quarter" idx="4"/>
+          </p:nvPr>
+        </p:nvSpPr>
+        <p:spPr/>
+        <p:txBody>
+          <a:bodyPr/>
+          <a:lstStyle/>
+          <a:p>
+            <a:fld id="{48F63A3B-78C7-47BE-AE5E-E10140E04643}" type="slidenum">
+              <a:rPr lang="en-US" smtClean="0"/>
+              <a:pPr/>
+              <a:t>9</a:t>
+            </a:fld>
+            <a:endParaRPr lang="en-US" dirty="0"/>
+          </a:p>
+        </p:txBody>
+      </p:sp>
+      <mc:AlternateContent xmlns:mc="http://schemas.openxmlformats.org/markup-compatibility/2006">
+        <mc:Choice xmlns:a14="http://schemas.microsoft.com/office/drawing/2010/main" Requires="a14">
+          <p:sp>
+            <p:nvSpPr>
+              <p:cNvPr id="12" name="Content Placeholder 2">
+                <a:extLst>
+                  <a:ext uri="{FF2B5EF4-FFF2-40B4-BE49-F238E27FC236}">
+                    <a16:creationId xmlns:a16="http://schemas.microsoft.com/office/drawing/2014/main" id="{5DCEB9ED-2241-F178-C119-1D5C8A43FC45}"/>
+                  </a:ext>
+                </a:extLst>
+              </p:cNvPr>
+              <p:cNvSpPr>
+                <a:spLocks noGrp="1"/>
+              </p:cNvSpPr>
+              <p:nvPr>
+                <p:ph sz="half" idx="10"/>
+              </p:nvPr>
+            </p:nvSpPr>
+            <p:spPr>
+              <a:xfrm>
+                <a:off x="2496000" y="1655409"/>
+                <a:ext cx="7200000" cy="5023181"/>
+              </a:xfrm>
+            </p:spPr>
+            <p:txBody>
+              <a:bodyPr anchor="ctr"/>
+              <a:lstStyle/>
+              <a:p>
+                <a:pPr marL="542925" indent="-447675">
+                  <a:buClr>
+                    <a:srgbClr val="00E47C"/>
+                  </a:buClr>
+                  <a:buFont typeface="Courier New" panose="02070309020205020404" pitchFamily="49" charset="0"/>
+                  <a:buChar char="o"/>
+                </a:pPr>
+                <a:r>
+                  <a:rPr lang="en-US" dirty="0"/>
+                  <a:t>Interim sample size re-estimation</a:t>
+                </a:r>
+              </a:p>
+              <a:p>
+                <a:pPr marL="542925" indent="-447675">
+                  <a:buClr>
+                    <a:srgbClr val="00E47C"/>
+                  </a:buClr>
+                  <a:buFont typeface="Courier New" panose="02070309020205020404" pitchFamily="49" charset="0"/>
+                  <a:buChar char="o"/>
+                </a:pPr>
+                <a:endParaRPr lang="en-US" dirty="0"/>
+              </a:p>
+              <a:p>
+                <a:pPr marL="542925" indent="-447675">
+                  <a:buClr>
+                    <a:srgbClr val="00E47C"/>
+                  </a:buClr>
+                  <a:buFont typeface="Courier New" panose="02070309020205020404" pitchFamily="49" charset="0"/>
+                  <a:buChar char="o"/>
+                </a:pPr>
+                <a:r>
+                  <a:rPr lang="en-US" dirty="0"/>
+                  <a:t>Multi-state models</a:t>
+                </a:r>
+                <a:br>
+                  <a:rPr lang="en-US" dirty="0"/>
+                </a:br>
+                <a:r>
+                  <a:rPr lang="en-US" dirty="0"/>
+                  <a:t>for joint models of </a:t>
+                </a:r>
+                <a14:m>
+                  <m:oMath xmlns:m="http://schemas.openxmlformats.org/officeDocument/2006/math">
+                    <m:r>
+                      <a:rPr lang="en-US" i="1" dirty="0" smtClean="0">
+                        <a:latin typeface="Cambria Math" panose="02040503050406030204" pitchFamily="18" charset="0"/>
+                      </a:rPr>
+                      <m:t>&gt;1</m:t>
+                    </m:r>
+                  </m:oMath>
+                </a14:m>
+                <a:r>
+                  <a:rPr lang="en-US" dirty="0"/>
+                  <a:t> endpoints</a:t>
+                </a:r>
+              </a:p>
+              <a:p>
+                <a:pPr marL="542925" indent="-447675">
+                  <a:buClr>
+                    <a:srgbClr val="00E47C"/>
+                  </a:buClr>
+                  <a:buFont typeface="Courier New" panose="02070309020205020404" pitchFamily="49" charset="0"/>
+                  <a:buChar char="o"/>
+                </a:pPr>
+                <a:endParaRPr lang="en-US" dirty="0"/>
+              </a:p>
+              <a:p>
+                <a:pPr marL="542925" indent="-447675">
+                  <a:buClr>
+                    <a:srgbClr val="00E47C"/>
+                  </a:buClr>
+                  <a:buFont typeface="Courier New" panose="02070309020205020404" pitchFamily="49" charset="0"/>
+                  <a:buChar char="o"/>
+                </a:pPr>
+                <a:endParaRPr lang="en-US" dirty="0"/>
+              </a:p>
+              <a:p>
+                <a:pPr marL="542925" indent="-447675">
+                  <a:buClr>
+                    <a:srgbClr val="00E47C"/>
+                  </a:buClr>
+                  <a:buFont typeface="Courier New" panose="02070309020205020404" pitchFamily="49" charset="0"/>
+                  <a:buChar char="o"/>
+                </a:pPr>
+                <a:endParaRPr lang="en-US" dirty="0"/>
+              </a:p>
+              <a:p>
+                <a:pPr marL="542925" indent="-447675">
+                  <a:buClr>
+                    <a:srgbClr val="00E47C"/>
+                  </a:buClr>
+                  <a:buFont typeface="Courier New" panose="02070309020205020404" pitchFamily="49" charset="0"/>
+                  <a:buChar char="o"/>
+                </a:pPr>
+                <a:endParaRPr lang="en-US" dirty="0"/>
+              </a:p>
+            </p:txBody>
+          </p:sp>
+        </mc:Choice>
+        <mc:Fallback>
+          <p:sp>
+            <p:nvSpPr>
+              <p:cNvPr id="12" name="Content Placeholder 2">
+                <a:extLst>
+                  <a:ext uri="{FF2B5EF4-FFF2-40B4-BE49-F238E27FC236}">
+                    <a16:creationId xmlns:a16="http://schemas.microsoft.com/office/drawing/2014/main" id="{5DCEB9ED-2241-F178-C119-1D5C8A43FC45}"/>
+                  </a:ext>
+                </a:extLst>
+              </p:cNvPr>
+              <p:cNvSpPr>
+                <a:spLocks noGrp="1" noRot="1" noChangeAspect="1" noMove="1" noResize="1" noEditPoints="1" noAdjustHandles="1" noChangeArrowheads="1" noChangeShapeType="1" noTextEdit="1"/>
+              </p:cNvSpPr>
+              <p:nvPr>
+                <p:ph sz="half" idx="10"/>
+              </p:nvPr>
+            </p:nvSpPr>
+            <p:spPr>
+              <a:xfrm>
+                <a:off x="2496000" y="1655409"/>
+                <a:ext cx="7200000" cy="5023181"/>
+              </a:xfrm>
+              <a:blipFill>
+                <a:blip r:embed="rId2"/>
+                <a:stretch>
+                  <a:fillRect l="-352"/>
+                </a:stretch>
+              </a:blipFill>
+            </p:spPr>
+            <p:txBody>
+              <a:bodyPr/>
+              <a:lstStyle/>
+              <a:p>
+                <a:r>
+                  <a:rPr lang="en-US">
+                    <a:noFill/>
+                  </a:rPr>
+                  <a:t> </a:t>
+                </a:r>
+              </a:p>
+            </p:txBody>
+          </p:sp>
+        </mc:Fallback>
+      </mc:AlternateContent>
+      <p:sp>
+        <p:nvSpPr>
+          <p:cNvPr id="3" name="Rounded Rectangle 2">
+            <a:extLst>
+              <a:ext uri="{FF2B5EF4-FFF2-40B4-BE49-F238E27FC236}">
+                <a16:creationId xmlns:a16="http://schemas.microsoft.com/office/drawing/2014/main" id="{0A96EB79-9843-AC94-FFB1-307DC410F3CC}"/>
+              </a:ext>
+            </a:extLst>
+          </p:cNvPr>
+          <p:cNvSpPr/>
+          <p:nvPr/>
+        </p:nvSpPr>
+        <p:spPr>
+          <a:xfrm>
+            <a:off x="2496000" y="5327904"/>
+            <a:ext cx="1584960" cy="977781"/>
+          </a:xfrm>
+          <a:prstGeom prst="roundRect">
+            <a:avLst/>
+          </a:prstGeom>
+          <a:solidFill>
+            <a:srgbClr val="00E47C"/>
+          </a:solidFill>
+          <a:ln>
+            <a:noFill/>
+          </a:ln>
+        </p:spPr>
+        <p:style>
+          <a:lnRef idx="2">
+            <a:schemeClr val="accent1">
+              <a:shade val="15000"/>
+            </a:schemeClr>
+          </a:lnRef>
+          <a:fillRef idx="1">
+            <a:schemeClr val="accent1"/>
+          </a:fillRef>
+          <a:effectRef idx="0">
+            <a:schemeClr val="accent1"/>
+          </a:effectRef>
+          <a:fontRef idx="minor">
+            <a:schemeClr val="lt1"/>
+          </a:fontRef>
+        </p:style>
+        <p:txBody>
+          <a:bodyPr rtlCol="0" anchor="ctr"/>
+          <a:lstStyle/>
+          <a:p>
+            <a:pPr algn="ctr"/>
+            <a:r>
+              <a:rPr lang="en-US" dirty="0">
+                <a:solidFill>
+                  <a:schemeClr val="tx1">
+                    <a:lumMod val="95000"/>
+                    <a:lumOff val="5000"/>
+                  </a:schemeClr>
+                </a:solidFill>
+                <a:latin typeface="Everett" panose="020B0504000000000000" pitchFamily="34" charset="77"/>
+              </a:rPr>
+              <a:t>progression-free</a:t>
+            </a:r>
+          </a:p>
+        </p:txBody>
+      </p:sp>
+      <p:sp>
+        <p:nvSpPr>
+          <p:cNvPr id="7" name="Rounded Rectangle 6">
+            <a:extLst>
+              <a:ext uri="{FF2B5EF4-FFF2-40B4-BE49-F238E27FC236}">
+                <a16:creationId xmlns:a16="http://schemas.microsoft.com/office/drawing/2014/main" id="{35BEA08B-217E-84C7-1FCB-337626DBACE8}"/>
+              </a:ext>
+            </a:extLst>
+          </p:cNvPr>
+          <p:cNvSpPr/>
+          <p:nvPr/>
+        </p:nvSpPr>
+        <p:spPr>
+          <a:xfrm>
+            <a:off x="5303520" y="4350122"/>
+            <a:ext cx="1584960" cy="977781"/>
+          </a:xfrm>
+          <a:prstGeom prst="roundRect">
+            <a:avLst/>
+          </a:prstGeom>
+          <a:solidFill>
+            <a:srgbClr val="00E47C"/>
+          </a:solidFill>
+          <a:ln>
+            <a:noFill/>
+          </a:ln>
+        </p:spPr>
+        <p:style>
+          <a:lnRef idx="2">
+            <a:schemeClr val="accent1">
+              <a:shade val="15000"/>
+            </a:schemeClr>
+          </a:lnRef>
+          <a:fillRef idx="1">
+            <a:schemeClr val="accent1"/>
+          </a:fillRef>
+          <a:effectRef idx="0">
+            <a:schemeClr val="accent1"/>
+          </a:effectRef>
+          <a:fontRef idx="minor">
+            <a:schemeClr val="lt1"/>
+          </a:fontRef>
+        </p:style>
+        <p:txBody>
+          <a:bodyPr rtlCol="0" anchor="ctr"/>
+          <a:lstStyle/>
+          <a:p>
+            <a:pPr algn="ctr"/>
+            <a:r>
+              <a:rPr lang="en-US" dirty="0">
+                <a:solidFill>
+                  <a:schemeClr val="tx1">
+                    <a:lumMod val="95000"/>
+                    <a:lumOff val="5000"/>
+                  </a:schemeClr>
+                </a:solidFill>
+                <a:latin typeface="Everett" panose="020B0504000000000000" pitchFamily="34" charset="77"/>
+              </a:rPr>
+              <a:t>progression</a:t>
+            </a:r>
+          </a:p>
+        </p:txBody>
+      </p:sp>
+      <p:sp>
+        <p:nvSpPr>
+          <p:cNvPr id="8" name="Rounded Rectangle 7">
+            <a:extLst>
+              <a:ext uri="{FF2B5EF4-FFF2-40B4-BE49-F238E27FC236}">
+                <a16:creationId xmlns:a16="http://schemas.microsoft.com/office/drawing/2014/main" id="{87C58D50-3254-AC96-3418-71C259FFA2A3}"/>
+              </a:ext>
+            </a:extLst>
+          </p:cNvPr>
+          <p:cNvSpPr/>
+          <p:nvPr/>
+        </p:nvSpPr>
+        <p:spPr>
+          <a:xfrm>
+            <a:off x="8111042" y="5327903"/>
+            <a:ext cx="1584960" cy="977781"/>
+          </a:xfrm>
+          <a:prstGeom prst="roundRect">
+            <a:avLst/>
+          </a:prstGeom>
+          <a:solidFill>
+            <a:srgbClr val="00E47C"/>
+          </a:solidFill>
+          <a:ln>
+            <a:noFill/>
+          </a:ln>
+        </p:spPr>
+        <p:style>
+          <a:lnRef idx="2">
+            <a:schemeClr val="accent1">
+              <a:shade val="15000"/>
+            </a:schemeClr>
+          </a:lnRef>
+          <a:fillRef idx="1">
+            <a:schemeClr val="accent1"/>
+          </a:fillRef>
+          <a:effectRef idx="0">
+            <a:schemeClr val="accent1"/>
+          </a:effectRef>
+          <a:fontRef idx="minor">
+            <a:schemeClr val="lt1"/>
+          </a:fontRef>
+        </p:style>
+        <p:txBody>
+          <a:bodyPr rtlCol="0" anchor="ctr"/>
+          <a:lstStyle/>
+          <a:p>
+            <a:pPr algn="ctr"/>
+            <a:r>
+              <a:rPr lang="en-US" dirty="0">
+                <a:solidFill>
+                  <a:schemeClr val="tx1">
+                    <a:lumMod val="95000"/>
+                    <a:lumOff val="5000"/>
+                  </a:schemeClr>
+                </a:solidFill>
+                <a:latin typeface="Everett" panose="020B0504000000000000" pitchFamily="34" charset="77"/>
+              </a:rPr>
+              <a:t>death</a:t>
+            </a:r>
+          </a:p>
+        </p:txBody>
+      </p:sp>
+      <p:cxnSp>
+        <p:nvCxnSpPr>
+          <p:cNvPr id="10" name="Straight Arrow Connector 9">
+            <a:extLst>
+              <a:ext uri="{FF2B5EF4-FFF2-40B4-BE49-F238E27FC236}">
+                <a16:creationId xmlns:a16="http://schemas.microsoft.com/office/drawing/2014/main" id="{E653323E-E7CF-D239-299F-52AED1C41887}"/>
+              </a:ext>
+            </a:extLst>
+          </p:cNvPr>
+          <p:cNvCxnSpPr>
+            <a:cxnSpLocks/>
+            <a:endCxn id="7" idx="1"/>
+          </p:cNvCxnSpPr>
+          <p:nvPr/>
+        </p:nvCxnSpPr>
+        <p:spPr>
+          <a:xfrm flipV="1">
+            <a:off x="4080959" y="4839013"/>
+            <a:ext cx="1222561" cy="825780"/>
+          </a:xfrm>
+          <a:prstGeom prst="straightConnector1">
+            <a:avLst/>
+          </a:prstGeom>
+          <a:ln w="38100">
+            <a:solidFill>
+              <a:schemeClr val="tx1">
+                <a:lumMod val="95000"/>
+                <a:lumOff val="5000"/>
+              </a:schemeClr>
+            </a:solidFill>
+            <a:tailEnd type="triangle"/>
+          </a:ln>
+        </p:spPr>
+        <p:style>
+          <a:lnRef idx="1">
+            <a:schemeClr val="accent1"/>
+          </a:lnRef>
+          <a:fillRef idx="0">
+            <a:schemeClr val="accent1"/>
+          </a:fillRef>
+          <a:effectRef idx="0">
+            <a:schemeClr val="accent1"/>
+          </a:effectRef>
+          <a:fontRef idx="minor">
+            <a:schemeClr val="tx1"/>
+          </a:fontRef>
+        </p:style>
+      </p:cxnSp>
+      <p:cxnSp>
+        <p:nvCxnSpPr>
+          <p:cNvPr id="11" name="Straight Arrow Connector 10">
+            <a:extLst>
+              <a:ext uri="{FF2B5EF4-FFF2-40B4-BE49-F238E27FC236}">
+                <a16:creationId xmlns:a16="http://schemas.microsoft.com/office/drawing/2014/main" id="{956F58A9-4354-5544-6102-92D78967C628}"/>
+              </a:ext>
+            </a:extLst>
+          </p:cNvPr>
+          <p:cNvCxnSpPr>
+            <a:cxnSpLocks/>
+          </p:cNvCxnSpPr>
+          <p:nvPr/>
+        </p:nvCxnSpPr>
+        <p:spPr>
+          <a:xfrm flipV="1">
+            <a:off x="4080960" y="5967230"/>
+            <a:ext cx="4030082" cy="1"/>
+          </a:xfrm>
+          <a:prstGeom prst="straightConnector1">
+            <a:avLst/>
+          </a:prstGeom>
+          <a:ln w="38100">
+            <a:solidFill>
+              <a:schemeClr val="tx1">
+                <a:lumMod val="95000"/>
+                <a:lumOff val="5000"/>
+              </a:schemeClr>
+            </a:solidFill>
+            <a:tailEnd type="triangle"/>
+          </a:ln>
+        </p:spPr>
+        <p:style>
+          <a:lnRef idx="1">
+            <a:schemeClr val="accent1"/>
+          </a:lnRef>
+          <a:fillRef idx="0">
+            <a:schemeClr val="accent1"/>
+          </a:fillRef>
+          <a:effectRef idx="0">
+            <a:schemeClr val="accent1"/>
+          </a:effectRef>
+          <a:fontRef idx="minor">
+            <a:schemeClr val="tx1"/>
+          </a:fontRef>
+        </p:style>
+      </p:cxnSp>
+      <p:cxnSp>
+        <p:nvCxnSpPr>
+          <p:cNvPr id="14" name="Straight Arrow Connector 13">
+            <a:extLst>
+              <a:ext uri="{FF2B5EF4-FFF2-40B4-BE49-F238E27FC236}">
+                <a16:creationId xmlns:a16="http://schemas.microsoft.com/office/drawing/2014/main" id="{7985E85B-5559-A4FE-B58E-590BD8D11C53}"/>
+              </a:ext>
+            </a:extLst>
+          </p:cNvPr>
+          <p:cNvCxnSpPr>
+            <a:cxnSpLocks/>
+          </p:cNvCxnSpPr>
+          <p:nvPr/>
+        </p:nvCxnSpPr>
+        <p:spPr>
+          <a:xfrm>
+            <a:off x="6888480" y="4839012"/>
+            <a:ext cx="1222560" cy="825781"/>
+          </a:xfrm>
+          <a:prstGeom prst="straightConnector1">
+            <a:avLst/>
+          </a:prstGeom>
+          <a:ln w="38100">
+            <a:solidFill>
+              <a:schemeClr val="tx1">
+                <a:lumMod val="95000"/>
+                <a:lumOff val="5000"/>
+              </a:schemeClr>
+            </a:solidFill>
+            <a:tailEnd type="triangle"/>
+          </a:ln>
+        </p:spPr>
+        <p:style>
+          <a:lnRef idx="1">
+            <a:schemeClr val="accent1"/>
+          </a:lnRef>
+          <a:fillRef idx="0">
+            <a:schemeClr val="accent1"/>
+          </a:fillRef>
+          <a:effectRef idx="0">
+            <a:schemeClr val="accent1"/>
+          </a:effectRef>
+          <a:fontRef idx="minor">
+            <a:schemeClr val="tx1"/>
+          </a:fontRef>
+        </p:style>
+      </p:cxnSp>
+    </p:spTree>
+    <p:extLst>
+      <p:ext uri="{BB962C8B-B14F-4D97-AF65-F5344CB8AC3E}">
+        <p14:creationId xmlns:p14="http://schemas.microsoft.com/office/powerpoint/2010/main" val="4048481505"/>
       </p:ext>
     </p:extLst>
   </p:cSld>

</xml_diff>